<commit_message>
add files, ppt and apk2java
</commit_message>
<xml_diff>
--- a/papers/AASSppt/AASS.pptx
+++ b/papers/AASSppt/AASS.pptx
@@ -5,7 +5,7 @@
     <p:sldMasterId id="2147483648" r:id="rId1"/>
   </p:sldMasterIdLst>
   <p:notesMasterIdLst>
-    <p:notesMasterId r:id="rId37"/>
+    <p:notesMasterId r:id="rId42"/>
   </p:notesMasterIdLst>
   <p:sldIdLst>
     <p:sldId id="256" r:id="rId2"/>
@@ -41,8 +41,13 @@
     <p:sldId id="283" r:id="rId32"/>
     <p:sldId id="284" r:id="rId33"/>
     <p:sldId id="285" r:id="rId34"/>
-    <p:sldId id="286" r:id="rId35"/>
-    <p:sldId id="287" r:id="rId36"/>
+    <p:sldId id="292" r:id="rId35"/>
+    <p:sldId id="293" r:id="rId36"/>
+    <p:sldId id="294" r:id="rId37"/>
+    <p:sldId id="295" r:id="rId38"/>
+    <p:sldId id="296" r:id="rId39"/>
+    <p:sldId id="286" r:id="rId40"/>
+    <p:sldId id="287" r:id="rId41"/>
   </p:sldIdLst>
   <p:sldSz cx="12192000" cy="6858000"/>
   <p:notesSz cx="6858000" cy="9144000"/>
@@ -3573,7 +3578,7 @@
           </a:ln>
           <a:extLst>
             <a:ext uri="{C572A759-6A51-4108-AA02-DFA0A04FC94B}">
-              <ma14:wrappingTextBoxFlag xmlns:ma14="http://schemas.microsoft.com/office/mac/drawingml/2011/main" xmlns="" val="1"/>
+              <ma14:wrappingTextBoxFlag xmlns="" xmlns:ma14="http://schemas.microsoft.com/office/mac/drawingml/2011/main" val="1"/>
             </a:ext>
           </a:extLst>
         </p:spPr>
@@ -3612,7 +3617,7 @@
           </a:ln>
           <a:extLst>
             <a:ext uri="{C572A759-6A51-4108-AA02-DFA0A04FC94B}">
-              <ma14:wrappingTextBoxFlag xmlns:ma14="http://schemas.microsoft.com/office/mac/drawingml/2011/main" xmlns="" val="1"/>
+              <ma14:wrappingTextBoxFlag xmlns="" xmlns:ma14="http://schemas.microsoft.com/office/mac/drawingml/2011/main" val="1"/>
             </a:ext>
           </a:extLst>
         </p:spPr>
@@ -4548,7 +4553,7 @@
           </a:ln>
           <a:extLst>
             <a:ext uri="{C572A759-6A51-4108-AA02-DFA0A04FC94B}">
-              <ma14:wrappingTextBoxFlag xmlns:ma14="http://schemas.microsoft.com/office/mac/drawingml/2011/main" xmlns="" val="1"/>
+              <ma14:wrappingTextBoxFlag xmlns="" xmlns:ma14="http://schemas.microsoft.com/office/mac/drawingml/2011/main" val="1"/>
             </a:ext>
           </a:extLst>
         </p:spPr>
@@ -4658,7 +4663,7 @@
           </a:ln>
           <a:extLst>
             <a:ext uri="{C572A759-6A51-4108-AA02-DFA0A04FC94B}">
-              <ma14:wrappingTextBoxFlag xmlns:ma14="http://schemas.microsoft.com/office/mac/drawingml/2011/main" xmlns="" val="1"/>
+              <ma14:wrappingTextBoxFlag xmlns="" xmlns:ma14="http://schemas.microsoft.com/office/mac/drawingml/2011/main" val="1"/>
             </a:ext>
           </a:extLst>
         </p:spPr>
@@ -4763,7 +4768,7 @@
           </a:ln>
           <a:extLst>
             <a:ext uri="{C572A759-6A51-4108-AA02-DFA0A04FC94B}">
-              <ma14:wrappingTextBoxFlag xmlns:ma14="http://schemas.microsoft.com/office/mac/drawingml/2011/main" xmlns="" val="1"/>
+              <ma14:wrappingTextBoxFlag xmlns="" xmlns:ma14="http://schemas.microsoft.com/office/mac/drawingml/2011/main" val="1"/>
             </a:ext>
           </a:extLst>
         </p:spPr>
@@ -4807,7 +4812,7 @@
           </a:ln>
           <a:extLst>
             <a:ext uri="{C572A759-6A51-4108-AA02-DFA0A04FC94B}">
-              <ma14:wrappingTextBoxFlag xmlns:ma14="http://schemas.microsoft.com/office/mac/drawingml/2011/main" xmlns="" val="1"/>
+              <ma14:wrappingTextBoxFlag xmlns="" xmlns:ma14="http://schemas.microsoft.com/office/mac/drawingml/2011/main" val="1"/>
             </a:ext>
           </a:extLst>
         </p:spPr>
@@ -4882,7 +4887,7 @@
           </a:ln>
           <a:extLst>
             <a:ext uri="{C572A759-6A51-4108-AA02-DFA0A04FC94B}">
-              <ma14:wrappingTextBoxFlag xmlns:ma14="http://schemas.microsoft.com/office/mac/drawingml/2011/main" xmlns="" val="1"/>
+              <ma14:wrappingTextBoxFlag xmlns="" xmlns:ma14="http://schemas.microsoft.com/office/mac/drawingml/2011/main" val="1"/>
             </a:ext>
           </a:extLst>
         </p:spPr>
@@ -5192,7 +5197,7 @@
           </a:ln>
           <a:extLst>
             <a:ext uri="{C572A759-6A51-4108-AA02-DFA0A04FC94B}">
-              <ma14:wrappingTextBoxFlag xmlns:ma14="http://schemas.microsoft.com/office/mac/drawingml/2011/main" xmlns="" val="1"/>
+              <ma14:wrappingTextBoxFlag xmlns="" xmlns:ma14="http://schemas.microsoft.com/office/mac/drawingml/2011/main" val="1"/>
             </a:ext>
           </a:extLst>
         </p:spPr>
@@ -5236,7 +5241,7 @@
           </a:ln>
           <a:extLst>
             <a:ext uri="{C572A759-6A51-4108-AA02-DFA0A04FC94B}">
-              <ma14:wrappingTextBoxFlag xmlns:ma14="http://schemas.microsoft.com/office/mac/drawingml/2011/main" xmlns="" val="1"/>
+              <ma14:wrappingTextBoxFlag xmlns="" xmlns:ma14="http://schemas.microsoft.com/office/mac/drawingml/2011/main" val="1"/>
             </a:ext>
           </a:extLst>
         </p:spPr>
@@ -5311,7 +5316,7 @@
           </a:ln>
           <a:extLst>
             <a:ext uri="{C572A759-6A51-4108-AA02-DFA0A04FC94B}">
-              <ma14:wrappingTextBoxFlag xmlns:ma14="http://schemas.microsoft.com/office/mac/drawingml/2011/main" xmlns="" val="1"/>
+              <ma14:wrappingTextBoxFlag xmlns="" xmlns:ma14="http://schemas.microsoft.com/office/mac/drawingml/2011/main" val="1"/>
             </a:ext>
           </a:extLst>
         </p:spPr>
@@ -5851,7 +5856,7 @@
           </a:ln>
           <a:extLst>
             <a:ext uri="{C572A759-6A51-4108-AA02-DFA0A04FC94B}">
-              <ma14:wrappingTextBoxFlag xmlns:ma14="http://schemas.microsoft.com/office/mac/drawingml/2011/main" xmlns="" val="1"/>
+              <ma14:wrappingTextBoxFlag xmlns="" xmlns:ma14="http://schemas.microsoft.com/office/mac/drawingml/2011/main" val="1"/>
             </a:ext>
           </a:extLst>
         </p:spPr>
@@ -5895,7 +5900,7 @@
           </a:ln>
           <a:extLst>
             <a:ext uri="{C572A759-6A51-4108-AA02-DFA0A04FC94B}">
-              <ma14:wrappingTextBoxFlag xmlns:ma14="http://schemas.microsoft.com/office/mac/drawingml/2011/main" xmlns="" val="1"/>
+              <ma14:wrappingTextBoxFlag xmlns="" xmlns:ma14="http://schemas.microsoft.com/office/mac/drawingml/2011/main" val="1"/>
             </a:ext>
           </a:extLst>
         </p:spPr>
@@ -6016,7 +6021,7 @@
           </a:ln>
           <a:extLst>
             <a:ext uri="{C572A759-6A51-4108-AA02-DFA0A04FC94B}">
-              <ma14:wrappingTextBoxFlag xmlns:ma14="http://schemas.microsoft.com/office/mac/drawingml/2011/main" xmlns="" val="1"/>
+              <ma14:wrappingTextBoxFlag xmlns="" xmlns:ma14="http://schemas.microsoft.com/office/mac/drawingml/2011/main" val="1"/>
             </a:ext>
           </a:extLst>
         </p:spPr>
@@ -6128,7 +6133,7 @@
           </a:ln>
           <a:extLst>
             <a:ext uri="{C572A759-6A51-4108-AA02-DFA0A04FC94B}">
-              <ma14:wrappingTextBoxFlag xmlns:ma14="http://schemas.microsoft.com/office/mac/drawingml/2011/main" xmlns="" val="1"/>
+              <ma14:wrappingTextBoxFlag xmlns="" xmlns:ma14="http://schemas.microsoft.com/office/mac/drawingml/2011/main" val="1"/>
             </a:ext>
           </a:extLst>
         </p:spPr>
@@ -6172,7 +6177,7 @@
           </a:ln>
           <a:extLst>
             <a:ext uri="{C572A759-6A51-4108-AA02-DFA0A04FC94B}">
-              <ma14:wrappingTextBoxFlag xmlns:ma14="http://schemas.microsoft.com/office/mac/drawingml/2011/main" xmlns="" val="1"/>
+              <ma14:wrappingTextBoxFlag xmlns="" xmlns:ma14="http://schemas.microsoft.com/office/mac/drawingml/2011/main" val="1"/>
             </a:ext>
           </a:extLst>
         </p:spPr>
@@ -6292,7 +6297,7 @@
           </a:ln>
           <a:extLst>
             <a:ext uri="{C572A759-6A51-4108-AA02-DFA0A04FC94B}">
-              <ma14:wrappingTextBoxFlag xmlns:ma14="http://schemas.microsoft.com/office/mac/drawingml/2011/main" xmlns="" val="1"/>
+              <ma14:wrappingTextBoxFlag xmlns="" xmlns:ma14="http://schemas.microsoft.com/office/mac/drawingml/2011/main" val="1"/>
             </a:ext>
           </a:extLst>
         </p:spPr>
@@ -6505,7 +6510,7 @@
           </a:ln>
           <a:extLst>
             <a:ext uri="{C572A759-6A51-4108-AA02-DFA0A04FC94B}">
-              <ma14:wrappingTextBoxFlag xmlns:ma14="http://schemas.microsoft.com/office/mac/drawingml/2011/main" xmlns="" val="1"/>
+              <ma14:wrappingTextBoxFlag xmlns="" xmlns:ma14="http://schemas.microsoft.com/office/mac/drawingml/2011/main" val="1"/>
             </a:ext>
           </a:extLst>
         </p:spPr>
@@ -6639,7 +6644,7 @@
           </a:ln>
           <a:extLst>
             <a:ext uri="{C572A759-6A51-4108-AA02-DFA0A04FC94B}">
-              <ma14:wrappingTextBoxFlag xmlns:ma14="http://schemas.microsoft.com/office/mac/drawingml/2011/main" xmlns="" val="1"/>
+              <ma14:wrappingTextBoxFlag xmlns="" xmlns:ma14="http://schemas.microsoft.com/office/mac/drawingml/2011/main" val="1"/>
             </a:ext>
           </a:extLst>
         </p:spPr>
@@ -6683,7 +6688,7 @@
           </a:ln>
           <a:extLst>
             <a:ext uri="{C572A759-6A51-4108-AA02-DFA0A04FC94B}">
-              <ma14:wrappingTextBoxFlag xmlns:ma14="http://schemas.microsoft.com/office/mac/drawingml/2011/main" xmlns="" val="1"/>
+              <ma14:wrappingTextBoxFlag xmlns="" xmlns:ma14="http://schemas.microsoft.com/office/mac/drawingml/2011/main" val="1"/>
             </a:ext>
           </a:extLst>
         </p:spPr>
@@ -6730,7 +6735,7 @@
           </a:ln>
           <a:extLst>
             <a:ext uri="{C572A759-6A51-4108-AA02-DFA0A04FC94B}">
-              <ma14:wrappingTextBoxFlag xmlns:ma14="http://schemas.microsoft.com/office/mac/drawingml/2011/main" xmlns="" val="1"/>
+              <ma14:wrappingTextBoxFlag xmlns="" xmlns:ma14="http://schemas.microsoft.com/office/mac/drawingml/2011/main" val="1"/>
             </a:ext>
           </a:extLst>
         </p:spPr>
@@ -6896,7 +6901,7 @@
           </a:ln>
           <a:extLst>
             <a:ext uri="{C572A759-6A51-4108-AA02-DFA0A04FC94B}">
-              <ma14:wrappingTextBoxFlag xmlns:ma14="http://schemas.microsoft.com/office/mac/drawingml/2011/main" xmlns="" val="1"/>
+              <ma14:wrappingTextBoxFlag xmlns="" xmlns:ma14="http://schemas.microsoft.com/office/mac/drawingml/2011/main" val="1"/>
             </a:ext>
           </a:extLst>
         </p:spPr>
@@ -6940,7 +6945,7 @@
           </a:ln>
           <a:extLst>
             <a:ext uri="{C572A759-6A51-4108-AA02-DFA0A04FC94B}">
-              <ma14:wrappingTextBoxFlag xmlns:ma14="http://schemas.microsoft.com/office/mac/drawingml/2011/main" xmlns="" val="1"/>
+              <ma14:wrappingTextBoxFlag xmlns="" xmlns:ma14="http://schemas.microsoft.com/office/mac/drawingml/2011/main" val="1"/>
             </a:ext>
           </a:extLst>
         </p:spPr>
@@ -6987,7 +6992,7 @@
           </a:ln>
           <a:extLst>
             <a:ext uri="{C572A759-6A51-4108-AA02-DFA0A04FC94B}">
-              <ma14:wrappingTextBoxFlag xmlns:ma14="http://schemas.microsoft.com/office/mac/drawingml/2011/main" xmlns="" val="1"/>
+              <ma14:wrappingTextBoxFlag xmlns="" xmlns:ma14="http://schemas.microsoft.com/office/mac/drawingml/2011/main" val="1"/>
             </a:ext>
           </a:extLst>
         </p:spPr>
@@ -7040,7 +7045,7 @@
           </a:ln>
           <a:extLst>
             <a:ext uri="{C572A759-6A51-4108-AA02-DFA0A04FC94B}">
-              <ma14:wrappingTextBoxFlag xmlns:ma14="http://schemas.microsoft.com/office/mac/drawingml/2011/main" xmlns="" val="1"/>
+              <ma14:wrappingTextBoxFlag xmlns="" xmlns:ma14="http://schemas.microsoft.com/office/mac/drawingml/2011/main" val="1"/>
             </a:ext>
           </a:extLst>
         </p:spPr>
@@ -7093,7 +7098,7 @@
           </a:ln>
           <a:extLst>
             <a:ext uri="{C572A759-6A51-4108-AA02-DFA0A04FC94B}">
-              <ma14:wrappingTextBoxFlag xmlns:ma14="http://schemas.microsoft.com/office/mac/drawingml/2011/main" xmlns="" val="1"/>
+              <ma14:wrappingTextBoxFlag xmlns="" xmlns:ma14="http://schemas.microsoft.com/office/mac/drawingml/2011/main" val="1"/>
             </a:ext>
           </a:extLst>
         </p:spPr>
@@ -7182,7 +7187,7 @@
           </a:ln>
           <a:extLst>
             <a:ext uri="{C572A759-6A51-4108-AA02-DFA0A04FC94B}">
-              <ma14:wrappingTextBoxFlag xmlns:ma14="http://schemas.microsoft.com/office/mac/drawingml/2011/main" xmlns="" val="1"/>
+              <ma14:wrappingTextBoxFlag xmlns="" xmlns:ma14="http://schemas.microsoft.com/office/mac/drawingml/2011/main" val="1"/>
             </a:ext>
           </a:extLst>
         </p:spPr>
@@ -7235,7 +7240,7 @@
           </a:ln>
           <a:extLst>
             <a:ext uri="{C572A759-6A51-4108-AA02-DFA0A04FC94B}">
-              <ma14:wrappingTextBoxFlag xmlns:ma14="http://schemas.microsoft.com/office/mac/drawingml/2011/main" xmlns="" val="1"/>
+              <ma14:wrappingTextBoxFlag xmlns="" xmlns:ma14="http://schemas.microsoft.com/office/mac/drawingml/2011/main" val="1"/>
             </a:ext>
           </a:extLst>
         </p:spPr>
@@ -7352,7 +7357,7 @@
           </a:ln>
           <a:extLst>
             <a:ext uri="{C572A759-6A51-4108-AA02-DFA0A04FC94B}">
-              <ma14:wrappingTextBoxFlag xmlns:ma14="http://schemas.microsoft.com/office/mac/drawingml/2011/main" xmlns="" val="1"/>
+              <ma14:wrappingTextBoxFlag xmlns="" xmlns:ma14="http://schemas.microsoft.com/office/mac/drawingml/2011/main" val="1"/>
             </a:ext>
           </a:extLst>
         </p:spPr>
@@ -7424,7 +7429,7 @@
           </a:ln>
           <a:extLst>
             <a:ext uri="{C572A759-6A51-4108-AA02-DFA0A04FC94B}">
-              <ma14:wrappingTextBoxFlag xmlns:ma14="http://schemas.microsoft.com/office/mac/drawingml/2011/main" xmlns="" val="1"/>
+              <ma14:wrappingTextBoxFlag xmlns="" xmlns:ma14="http://schemas.microsoft.com/office/mac/drawingml/2011/main" val="1"/>
             </a:ext>
           </a:extLst>
         </p:spPr>
@@ -7495,7 +7500,7 @@
           </a:ln>
           <a:extLst>
             <a:ext uri="{C572A759-6A51-4108-AA02-DFA0A04FC94B}">
-              <ma14:wrappingTextBoxFlag xmlns:ma14="http://schemas.microsoft.com/office/mac/drawingml/2011/main" xmlns="" val="1"/>
+              <ma14:wrappingTextBoxFlag xmlns="" xmlns:ma14="http://schemas.microsoft.com/office/mac/drawingml/2011/main" val="1"/>
             </a:ext>
           </a:extLst>
         </p:spPr>
@@ -7566,7 +7571,7 @@
           </a:ln>
           <a:extLst>
             <a:ext uri="{C572A759-6A51-4108-AA02-DFA0A04FC94B}">
-              <ma14:wrappingTextBoxFlag xmlns:ma14="http://schemas.microsoft.com/office/mac/drawingml/2011/main" xmlns="" val="1"/>
+              <ma14:wrappingTextBoxFlag xmlns="" xmlns:ma14="http://schemas.microsoft.com/office/mac/drawingml/2011/main" val="1"/>
             </a:ext>
           </a:extLst>
         </p:spPr>
@@ -7637,7 +7642,7 @@
           </a:ln>
           <a:extLst>
             <a:ext uri="{C572A759-6A51-4108-AA02-DFA0A04FC94B}">
-              <ma14:wrappingTextBoxFlag xmlns:ma14="http://schemas.microsoft.com/office/mac/drawingml/2011/main" xmlns="" val="1"/>
+              <ma14:wrappingTextBoxFlag xmlns="" xmlns:ma14="http://schemas.microsoft.com/office/mac/drawingml/2011/main" val="1"/>
             </a:ext>
           </a:extLst>
         </p:spPr>
@@ -7708,7 +7713,7 @@
           </a:ln>
           <a:extLst>
             <a:ext uri="{C572A759-6A51-4108-AA02-DFA0A04FC94B}">
-              <ma14:wrappingTextBoxFlag xmlns:ma14="http://schemas.microsoft.com/office/mac/drawingml/2011/main" xmlns="" val="1"/>
+              <ma14:wrappingTextBoxFlag xmlns="" xmlns:ma14="http://schemas.microsoft.com/office/mac/drawingml/2011/main" val="1"/>
             </a:ext>
           </a:extLst>
         </p:spPr>
@@ -8705,7 +8710,7 @@
           </a:ln>
           <a:extLst>
             <a:ext uri="{C572A759-6A51-4108-AA02-DFA0A04FC94B}">
-              <ma14:wrappingTextBoxFlag xmlns:ma14="http://schemas.microsoft.com/office/mac/drawingml/2011/main" xmlns="" val="1"/>
+              <ma14:wrappingTextBoxFlag xmlns="" xmlns:ma14="http://schemas.microsoft.com/office/mac/drawingml/2011/main" val="1"/>
             </a:ext>
           </a:extLst>
         </p:spPr>
@@ -8749,7 +8754,7 @@
           </a:ln>
           <a:extLst>
             <a:ext uri="{C572A759-6A51-4108-AA02-DFA0A04FC94B}">
-              <ma14:wrappingTextBoxFlag xmlns:ma14="http://schemas.microsoft.com/office/mac/drawingml/2011/main" xmlns="" val="1"/>
+              <ma14:wrappingTextBoxFlag xmlns="" xmlns:ma14="http://schemas.microsoft.com/office/mac/drawingml/2011/main" val="1"/>
             </a:ext>
           </a:extLst>
         </p:spPr>
@@ -8796,7 +8801,7 @@
           </a:ln>
           <a:extLst>
             <a:ext uri="{C572A759-6A51-4108-AA02-DFA0A04FC94B}">
-              <ma14:wrappingTextBoxFlag xmlns:ma14="http://schemas.microsoft.com/office/mac/drawingml/2011/main" xmlns="" val="1"/>
+              <ma14:wrappingTextBoxFlag xmlns="" xmlns:ma14="http://schemas.microsoft.com/office/mac/drawingml/2011/main" val="1"/>
             </a:ext>
           </a:extLst>
         </p:spPr>
@@ -8849,7 +8854,7 @@
           </a:ln>
           <a:extLst>
             <a:ext uri="{C572A759-6A51-4108-AA02-DFA0A04FC94B}">
-              <ma14:wrappingTextBoxFlag xmlns:ma14="http://schemas.microsoft.com/office/mac/drawingml/2011/main" xmlns="" val="1"/>
+              <ma14:wrappingTextBoxFlag xmlns="" xmlns:ma14="http://schemas.microsoft.com/office/mac/drawingml/2011/main" val="1"/>
             </a:ext>
           </a:extLst>
         </p:spPr>
@@ -9062,7 +9067,7 @@
           </a:ln>
           <a:extLst>
             <a:ext uri="{C572A759-6A51-4108-AA02-DFA0A04FC94B}">
-              <ma14:wrappingTextBoxFlag xmlns:ma14="http://schemas.microsoft.com/office/mac/drawingml/2011/main" xmlns="" val="1"/>
+              <ma14:wrappingTextBoxFlag xmlns="" xmlns:ma14="http://schemas.microsoft.com/office/mac/drawingml/2011/main" val="1"/>
             </a:ext>
           </a:extLst>
         </p:spPr>
@@ -9252,7 +9257,7 @@
           </a:ln>
           <a:extLst>
             <a:ext uri="{C572A759-6A51-4108-AA02-DFA0A04FC94B}">
-              <ma14:wrappingTextBoxFlag xmlns:ma14="http://schemas.microsoft.com/office/mac/drawingml/2011/main" xmlns="" val="1"/>
+              <ma14:wrappingTextBoxFlag xmlns="" xmlns:ma14="http://schemas.microsoft.com/office/mac/drawingml/2011/main" val="1"/>
             </a:ext>
           </a:extLst>
         </p:spPr>
@@ -9296,7 +9301,7 @@
           </a:ln>
           <a:extLst>
             <a:ext uri="{C572A759-6A51-4108-AA02-DFA0A04FC94B}">
-              <ma14:wrappingTextBoxFlag xmlns:ma14="http://schemas.microsoft.com/office/mac/drawingml/2011/main" xmlns="" val="1"/>
+              <ma14:wrappingTextBoxFlag xmlns="" xmlns:ma14="http://schemas.microsoft.com/office/mac/drawingml/2011/main" val="1"/>
             </a:ext>
           </a:extLst>
         </p:spPr>
@@ -9343,7 +9348,7 @@
           </a:ln>
           <a:extLst>
             <a:ext uri="{C572A759-6A51-4108-AA02-DFA0A04FC94B}">
-              <ma14:wrappingTextBoxFlag xmlns:ma14="http://schemas.microsoft.com/office/mac/drawingml/2011/main" xmlns="" val="1"/>
+              <ma14:wrappingTextBoxFlag xmlns="" xmlns:ma14="http://schemas.microsoft.com/office/mac/drawingml/2011/main" val="1"/>
             </a:ext>
           </a:extLst>
         </p:spPr>
@@ -9396,7 +9401,7 @@
           </a:ln>
           <a:extLst>
             <a:ext uri="{C572A759-6A51-4108-AA02-DFA0A04FC94B}">
-              <ma14:wrappingTextBoxFlag xmlns:ma14="http://schemas.microsoft.com/office/mac/drawingml/2011/main" xmlns="" val="1"/>
+              <ma14:wrappingTextBoxFlag xmlns="" xmlns:ma14="http://schemas.microsoft.com/office/mac/drawingml/2011/main" val="1"/>
             </a:ext>
           </a:extLst>
         </p:spPr>
@@ -9583,7 +9588,7 @@
           </a:ln>
           <a:extLst>
             <a:ext uri="{C572A759-6A51-4108-AA02-DFA0A04FC94B}">
-              <ma14:wrappingTextBoxFlag xmlns:ma14="http://schemas.microsoft.com/office/mac/drawingml/2011/main" xmlns="" val="1"/>
+              <ma14:wrappingTextBoxFlag xmlns="" xmlns:ma14="http://schemas.microsoft.com/office/mac/drawingml/2011/main" val="1"/>
             </a:ext>
           </a:extLst>
         </p:spPr>
@@ -9627,7 +9632,7 @@
           </a:ln>
           <a:extLst>
             <a:ext uri="{C572A759-6A51-4108-AA02-DFA0A04FC94B}">
-              <ma14:wrappingTextBoxFlag xmlns:ma14="http://schemas.microsoft.com/office/mac/drawingml/2011/main" xmlns="" val="1"/>
+              <ma14:wrappingTextBoxFlag xmlns="" xmlns:ma14="http://schemas.microsoft.com/office/mac/drawingml/2011/main" val="1"/>
             </a:ext>
           </a:extLst>
         </p:spPr>
@@ -9674,7 +9679,7 @@
           </a:ln>
           <a:extLst>
             <a:ext uri="{C572A759-6A51-4108-AA02-DFA0A04FC94B}">
-              <ma14:wrappingTextBoxFlag xmlns:ma14="http://schemas.microsoft.com/office/mac/drawingml/2011/main" xmlns="" val="1"/>
+              <ma14:wrappingTextBoxFlag xmlns="" xmlns:ma14="http://schemas.microsoft.com/office/mac/drawingml/2011/main" val="1"/>
             </a:ext>
           </a:extLst>
         </p:spPr>
@@ -9818,7 +9823,7 @@
           </a:ln>
           <a:extLst>
             <a:ext uri="{C572A759-6A51-4108-AA02-DFA0A04FC94B}">
-              <ma14:wrappingTextBoxFlag xmlns:ma14="http://schemas.microsoft.com/office/mac/drawingml/2011/main" xmlns="" val="1"/>
+              <ma14:wrappingTextBoxFlag xmlns="" xmlns:ma14="http://schemas.microsoft.com/office/mac/drawingml/2011/main" val="1"/>
             </a:ext>
           </a:extLst>
         </p:spPr>
@@ -9919,7 +9924,7 @@
           </a:ln>
           <a:extLst>
             <a:ext uri="{C572A759-6A51-4108-AA02-DFA0A04FC94B}">
-              <ma14:wrappingTextBoxFlag xmlns:ma14="http://schemas.microsoft.com/office/mac/drawingml/2011/main" xmlns="" val="1"/>
+              <ma14:wrappingTextBoxFlag xmlns="" xmlns:ma14="http://schemas.microsoft.com/office/mac/drawingml/2011/main" val="1"/>
             </a:ext>
           </a:extLst>
         </p:spPr>
@@ -9963,7 +9968,7 @@
           </a:ln>
           <a:extLst>
             <a:ext uri="{C572A759-6A51-4108-AA02-DFA0A04FC94B}">
-              <ma14:wrappingTextBoxFlag xmlns:ma14="http://schemas.microsoft.com/office/mac/drawingml/2011/main" xmlns="" val="1"/>
+              <ma14:wrappingTextBoxFlag xmlns="" xmlns:ma14="http://schemas.microsoft.com/office/mac/drawingml/2011/main" val="1"/>
             </a:ext>
           </a:extLst>
         </p:spPr>
@@ -10010,7 +10015,7 @@
           </a:ln>
           <a:extLst>
             <a:ext uri="{C572A759-6A51-4108-AA02-DFA0A04FC94B}">
-              <ma14:wrappingTextBoxFlag xmlns:ma14="http://schemas.microsoft.com/office/mac/drawingml/2011/main" xmlns="" val="1"/>
+              <ma14:wrappingTextBoxFlag xmlns="" xmlns:ma14="http://schemas.microsoft.com/office/mac/drawingml/2011/main" val="1"/>
             </a:ext>
           </a:extLst>
         </p:spPr>
@@ -10092,7 +10097,7 @@
           </a:ln>
           <a:extLst>
             <a:ext uri="{C572A759-6A51-4108-AA02-DFA0A04FC94B}">
-              <ma14:wrappingTextBoxFlag xmlns:ma14="http://schemas.microsoft.com/office/mac/drawingml/2011/main" xmlns="" val="1"/>
+              <ma14:wrappingTextBoxFlag xmlns="" xmlns:ma14="http://schemas.microsoft.com/office/mac/drawingml/2011/main" val="1"/>
             </a:ext>
           </a:extLst>
         </p:spPr>
@@ -10207,7 +10212,7 @@
           </a:ln>
           <a:extLst>
             <a:ext uri="{C572A759-6A51-4108-AA02-DFA0A04FC94B}">
-              <ma14:wrappingTextBoxFlag xmlns:ma14="http://schemas.microsoft.com/office/mac/drawingml/2011/main" xmlns="" val="1"/>
+              <ma14:wrappingTextBoxFlag xmlns="" xmlns:ma14="http://schemas.microsoft.com/office/mac/drawingml/2011/main" val="1"/>
             </a:ext>
           </a:extLst>
         </p:spPr>
@@ -10251,7 +10256,7 @@
           </a:ln>
           <a:extLst>
             <a:ext uri="{C572A759-6A51-4108-AA02-DFA0A04FC94B}">
-              <ma14:wrappingTextBoxFlag xmlns:ma14="http://schemas.microsoft.com/office/mac/drawingml/2011/main" xmlns="" val="1"/>
+              <ma14:wrappingTextBoxFlag xmlns="" xmlns:ma14="http://schemas.microsoft.com/office/mac/drawingml/2011/main" val="1"/>
             </a:ext>
           </a:extLst>
         </p:spPr>
@@ -10298,7 +10303,7 @@
           </a:ln>
           <a:extLst>
             <a:ext uri="{C572A759-6A51-4108-AA02-DFA0A04FC94B}">
-              <ma14:wrappingTextBoxFlag xmlns:ma14="http://schemas.microsoft.com/office/mac/drawingml/2011/main" xmlns="" val="1"/>
+              <ma14:wrappingTextBoxFlag xmlns="" xmlns:ma14="http://schemas.microsoft.com/office/mac/drawingml/2011/main" val="1"/>
             </a:ext>
           </a:extLst>
         </p:spPr>
@@ -10379,7 +10384,7 @@
           </a:ln>
           <a:extLst>
             <a:ext uri="{C572A759-6A51-4108-AA02-DFA0A04FC94B}">
-              <ma14:wrappingTextBoxFlag xmlns:ma14="http://schemas.microsoft.com/office/mac/drawingml/2011/main" xmlns="" val="1"/>
+              <ma14:wrappingTextBoxFlag xmlns="" xmlns:ma14="http://schemas.microsoft.com/office/mac/drawingml/2011/main" val="1"/>
             </a:ext>
           </a:extLst>
         </p:spPr>
@@ -10450,7 +10455,7 @@
           </a:ln>
           <a:extLst>
             <a:ext uri="{C572A759-6A51-4108-AA02-DFA0A04FC94B}">
-              <ma14:wrappingTextBoxFlag xmlns:ma14="http://schemas.microsoft.com/office/mac/drawingml/2011/main" xmlns="" val="1"/>
+              <ma14:wrappingTextBoxFlag xmlns="" xmlns:ma14="http://schemas.microsoft.com/office/mac/drawingml/2011/main" val="1"/>
             </a:ext>
           </a:extLst>
         </p:spPr>
@@ -10521,7 +10526,7 @@
           </a:ln>
           <a:extLst>
             <a:ext uri="{C572A759-6A51-4108-AA02-DFA0A04FC94B}">
-              <ma14:wrappingTextBoxFlag xmlns:ma14="http://schemas.microsoft.com/office/mac/drawingml/2011/main" xmlns="" val="1"/>
+              <ma14:wrappingTextBoxFlag xmlns="" xmlns:ma14="http://schemas.microsoft.com/office/mac/drawingml/2011/main" val="1"/>
             </a:ext>
           </a:extLst>
         </p:spPr>
@@ -10592,7 +10597,7 @@
           </a:ln>
           <a:extLst>
             <a:ext uri="{C572A759-6A51-4108-AA02-DFA0A04FC94B}">
-              <ma14:wrappingTextBoxFlag xmlns:ma14="http://schemas.microsoft.com/office/mac/drawingml/2011/main" xmlns="" val="1"/>
+              <ma14:wrappingTextBoxFlag xmlns="" xmlns:ma14="http://schemas.microsoft.com/office/mac/drawingml/2011/main" val="1"/>
             </a:ext>
           </a:extLst>
         </p:spPr>
@@ -10663,7 +10668,7 @@
           </a:ln>
           <a:extLst>
             <a:ext uri="{C572A759-6A51-4108-AA02-DFA0A04FC94B}">
-              <ma14:wrappingTextBoxFlag xmlns:ma14="http://schemas.microsoft.com/office/mac/drawingml/2011/main" xmlns="" val="1"/>
+              <ma14:wrappingTextBoxFlag xmlns="" xmlns:ma14="http://schemas.microsoft.com/office/mac/drawingml/2011/main" val="1"/>
             </a:ext>
           </a:extLst>
         </p:spPr>
@@ -10734,7 +10739,7 @@
           </a:ln>
           <a:extLst>
             <a:ext uri="{C572A759-6A51-4108-AA02-DFA0A04FC94B}">
-              <ma14:wrappingTextBoxFlag xmlns:ma14="http://schemas.microsoft.com/office/mac/drawingml/2011/main" xmlns="" val="1"/>
+              <ma14:wrappingTextBoxFlag xmlns="" xmlns:ma14="http://schemas.microsoft.com/office/mac/drawingml/2011/main" val="1"/>
             </a:ext>
           </a:extLst>
         </p:spPr>
@@ -11204,7 +11209,7 @@
           </a:ln>
           <a:extLst>
             <a:ext uri="{C572A759-6A51-4108-AA02-DFA0A04FC94B}">
-              <ma14:wrappingTextBoxFlag xmlns:ma14="http://schemas.microsoft.com/office/mac/drawingml/2011/main" xmlns="" val="1"/>
+              <ma14:wrappingTextBoxFlag xmlns="" xmlns:ma14="http://schemas.microsoft.com/office/mac/drawingml/2011/main" val="1"/>
             </a:ext>
           </a:extLst>
         </p:spPr>
@@ -11247,7 +11252,7 @@
           </a:ln>
           <a:extLst>
             <a:ext uri="{C572A759-6A51-4108-AA02-DFA0A04FC94B}">
-              <ma14:wrappingTextBoxFlag xmlns:ma14="http://schemas.microsoft.com/office/mac/drawingml/2011/main" xmlns="" val="1"/>
+              <ma14:wrappingTextBoxFlag xmlns="" xmlns:ma14="http://schemas.microsoft.com/office/mac/drawingml/2011/main" val="1"/>
             </a:ext>
           </a:extLst>
         </p:spPr>
@@ -11290,7 +11295,7 @@
           </a:ln>
           <a:extLst>
             <a:ext uri="{C572A759-6A51-4108-AA02-DFA0A04FC94B}">
-              <ma14:wrappingTextBoxFlag xmlns:ma14="http://schemas.microsoft.com/office/mac/drawingml/2011/main" xmlns="" val="1"/>
+              <ma14:wrappingTextBoxFlag xmlns="" xmlns:ma14="http://schemas.microsoft.com/office/mac/drawingml/2011/main" val="1"/>
             </a:ext>
           </a:extLst>
         </p:spPr>
@@ -11333,7 +11338,7 @@
           </a:ln>
           <a:extLst>
             <a:ext uri="{C572A759-6A51-4108-AA02-DFA0A04FC94B}">
-              <ma14:wrappingTextBoxFlag xmlns:ma14="http://schemas.microsoft.com/office/mac/drawingml/2011/main" xmlns="" val="1"/>
+              <ma14:wrappingTextBoxFlag xmlns="" xmlns:ma14="http://schemas.microsoft.com/office/mac/drawingml/2011/main" val="1"/>
             </a:ext>
           </a:extLst>
         </p:spPr>
@@ -11376,7 +11381,7 @@
           </a:ln>
           <a:extLst>
             <a:ext uri="{C572A759-6A51-4108-AA02-DFA0A04FC94B}">
-              <ma14:wrappingTextBoxFlag xmlns:ma14="http://schemas.microsoft.com/office/mac/drawingml/2011/main" xmlns="" val="1"/>
+              <ma14:wrappingTextBoxFlag xmlns="" xmlns:ma14="http://schemas.microsoft.com/office/mac/drawingml/2011/main" val="1"/>
             </a:ext>
           </a:extLst>
         </p:spPr>
@@ -11419,7 +11424,7 @@
           </a:ln>
           <a:extLst>
             <a:ext uri="{C572A759-6A51-4108-AA02-DFA0A04FC94B}">
-              <ma14:wrappingTextBoxFlag xmlns:ma14="http://schemas.microsoft.com/office/mac/drawingml/2011/main" xmlns="" val="1"/>
+              <ma14:wrappingTextBoxFlag xmlns="" xmlns:ma14="http://schemas.microsoft.com/office/mac/drawingml/2011/main" val="1"/>
             </a:ext>
           </a:extLst>
         </p:spPr>
@@ -11462,7 +11467,7 @@
           </a:ln>
           <a:extLst>
             <a:ext uri="{C572A759-6A51-4108-AA02-DFA0A04FC94B}">
-              <ma14:wrappingTextBoxFlag xmlns:ma14="http://schemas.microsoft.com/office/mac/drawingml/2011/main" xmlns="" val="1"/>
+              <ma14:wrappingTextBoxFlag xmlns="" xmlns:ma14="http://schemas.microsoft.com/office/mac/drawingml/2011/main" val="1"/>
             </a:ext>
           </a:extLst>
         </p:spPr>
@@ -11538,7 +11543,7 @@
           </a:ln>
           <a:extLst>
             <a:ext uri="{C572A759-6A51-4108-AA02-DFA0A04FC94B}">
-              <ma14:wrappingTextBoxFlag xmlns:ma14="http://schemas.microsoft.com/office/mac/drawingml/2011/main" xmlns="" val="1"/>
+              <ma14:wrappingTextBoxFlag xmlns="" xmlns:ma14="http://schemas.microsoft.com/office/mac/drawingml/2011/main" val="1"/>
             </a:ext>
           </a:extLst>
         </p:spPr>
@@ -11620,7 +11625,7 @@
           </a:ln>
           <a:extLst>
             <a:ext uri="{C572A759-6A51-4108-AA02-DFA0A04FC94B}">
-              <ma14:wrappingTextBoxFlag xmlns:ma14="http://schemas.microsoft.com/office/mac/drawingml/2011/main" xmlns="" val="1"/>
+              <ma14:wrappingTextBoxFlag xmlns="" xmlns:ma14="http://schemas.microsoft.com/office/mac/drawingml/2011/main" val="1"/>
             </a:ext>
           </a:extLst>
         </p:spPr>
@@ -11971,7 +11976,7 @@
           </a:ln>
           <a:extLst>
             <a:ext uri="{C572A759-6A51-4108-AA02-DFA0A04FC94B}">
-              <ma14:wrappingTextBoxFlag xmlns:ma14="http://schemas.microsoft.com/office/mac/drawingml/2011/main" xmlns="" val="1"/>
+              <ma14:wrappingTextBoxFlag xmlns="" xmlns:ma14="http://schemas.microsoft.com/office/mac/drawingml/2011/main" val="1"/>
             </a:ext>
           </a:extLst>
         </p:spPr>
@@ -12015,7 +12020,7 @@
           </a:ln>
           <a:extLst>
             <a:ext uri="{C572A759-6A51-4108-AA02-DFA0A04FC94B}">
-              <ma14:wrappingTextBoxFlag xmlns:ma14="http://schemas.microsoft.com/office/mac/drawingml/2011/main" xmlns="" val="1"/>
+              <ma14:wrappingTextBoxFlag xmlns="" xmlns:ma14="http://schemas.microsoft.com/office/mac/drawingml/2011/main" val="1"/>
             </a:ext>
           </a:extLst>
         </p:spPr>
@@ -12062,7 +12067,7 @@
           </a:ln>
           <a:extLst>
             <a:ext uri="{C572A759-6A51-4108-AA02-DFA0A04FC94B}">
-              <ma14:wrappingTextBoxFlag xmlns:ma14="http://schemas.microsoft.com/office/mac/drawingml/2011/main" xmlns="" val="1"/>
+              <ma14:wrappingTextBoxFlag xmlns="" xmlns:ma14="http://schemas.microsoft.com/office/mac/drawingml/2011/main" val="1"/>
             </a:ext>
           </a:extLst>
         </p:spPr>
@@ -12115,7 +12120,7 @@
           </a:ln>
           <a:extLst>
             <a:ext uri="{C572A759-6A51-4108-AA02-DFA0A04FC94B}">
-              <ma14:wrappingTextBoxFlag xmlns:ma14="http://schemas.microsoft.com/office/mac/drawingml/2011/main" xmlns="" val="1"/>
+              <ma14:wrappingTextBoxFlag xmlns="" xmlns:ma14="http://schemas.microsoft.com/office/mac/drawingml/2011/main" val="1"/>
             </a:ext>
           </a:extLst>
         </p:spPr>
@@ -12254,7 +12259,7 @@
           </a:ln>
           <a:extLst>
             <a:ext uri="{C572A759-6A51-4108-AA02-DFA0A04FC94B}">
-              <ma14:wrappingTextBoxFlag xmlns:ma14="http://schemas.microsoft.com/office/mac/drawingml/2011/main" xmlns="" val="1"/>
+              <ma14:wrappingTextBoxFlag xmlns="" xmlns:ma14="http://schemas.microsoft.com/office/mac/drawingml/2011/main" val="1"/>
             </a:ext>
           </a:extLst>
         </p:spPr>
@@ -12298,7 +12303,7 @@
           </a:ln>
           <a:extLst>
             <a:ext uri="{C572A759-6A51-4108-AA02-DFA0A04FC94B}">
-              <ma14:wrappingTextBoxFlag xmlns:ma14="http://schemas.microsoft.com/office/mac/drawingml/2011/main" xmlns="" val="1"/>
+              <ma14:wrappingTextBoxFlag xmlns="" xmlns:ma14="http://schemas.microsoft.com/office/mac/drawingml/2011/main" val="1"/>
             </a:ext>
           </a:extLst>
         </p:spPr>
@@ -12345,7 +12350,7 @@
           </a:ln>
           <a:extLst>
             <a:ext uri="{C572A759-6A51-4108-AA02-DFA0A04FC94B}">
-              <ma14:wrappingTextBoxFlag xmlns:ma14="http://schemas.microsoft.com/office/mac/drawingml/2011/main" xmlns="" val="1"/>
+              <ma14:wrappingTextBoxFlag xmlns="" xmlns:ma14="http://schemas.microsoft.com/office/mac/drawingml/2011/main" val="1"/>
             </a:ext>
           </a:extLst>
         </p:spPr>
@@ -12398,7 +12403,7 @@
           </a:ln>
           <a:extLst>
             <a:ext uri="{C572A759-6A51-4108-AA02-DFA0A04FC94B}">
-              <ma14:wrappingTextBoxFlag xmlns:ma14="http://schemas.microsoft.com/office/mac/drawingml/2011/main" xmlns="" val="1"/>
+              <ma14:wrappingTextBoxFlag xmlns="" xmlns:ma14="http://schemas.microsoft.com/office/mac/drawingml/2011/main" val="1"/>
             </a:ext>
           </a:extLst>
         </p:spPr>
@@ -12451,7 +12456,7 @@
           </a:ln>
           <a:extLst>
             <a:ext uri="{C572A759-6A51-4108-AA02-DFA0A04FC94B}">
-              <ma14:wrappingTextBoxFlag xmlns:ma14="http://schemas.microsoft.com/office/mac/drawingml/2011/main" xmlns="" val="1"/>
+              <ma14:wrappingTextBoxFlag xmlns="" xmlns:ma14="http://schemas.microsoft.com/office/mac/drawingml/2011/main" val="1"/>
             </a:ext>
           </a:extLst>
         </p:spPr>
@@ -12504,7 +12509,7 @@
           </a:ln>
           <a:extLst>
             <a:ext uri="{C572A759-6A51-4108-AA02-DFA0A04FC94B}">
-              <ma14:wrappingTextBoxFlag xmlns:ma14="http://schemas.microsoft.com/office/mac/drawingml/2011/main" xmlns="" val="1"/>
+              <ma14:wrappingTextBoxFlag xmlns="" xmlns:ma14="http://schemas.microsoft.com/office/mac/drawingml/2011/main" val="1"/>
             </a:ext>
           </a:extLst>
         </p:spPr>
@@ -12558,7 +12563,7 @@
           </a:ln>
           <a:extLst>
             <a:ext uri="{C572A759-6A51-4108-AA02-DFA0A04FC94B}">
-              <ma14:wrappingTextBoxFlag xmlns:ma14="http://schemas.microsoft.com/office/mac/drawingml/2011/main" xmlns="" val="1"/>
+              <ma14:wrappingTextBoxFlag xmlns="" xmlns:ma14="http://schemas.microsoft.com/office/mac/drawingml/2011/main" val="1"/>
             </a:ext>
           </a:extLst>
         </p:spPr>
@@ -13431,7 +13436,7 @@
           </a:ln>
           <a:extLst>
             <a:ext uri="{C572A759-6A51-4108-AA02-DFA0A04FC94B}">
-              <ma14:wrappingTextBoxFlag xmlns:ma14="http://schemas.microsoft.com/office/mac/drawingml/2011/main" xmlns="" val="1"/>
+              <ma14:wrappingTextBoxFlag xmlns="" xmlns:ma14="http://schemas.microsoft.com/office/mac/drawingml/2011/main" val="1"/>
             </a:ext>
           </a:extLst>
         </p:spPr>
@@ -13541,7 +13546,7 @@
           </a:ln>
           <a:extLst>
             <a:ext uri="{C572A759-6A51-4108-AA02-DFA0A04FC94B}">
-              <ma14:wrappingTextBoxFlag xmlns:ma14="http://schemas.microsoft.com/office/mac/drawingml/2011/main" xmlns="" val="1"/>
+              <ma14:wrappingTextBoxFlag xmlns="" xmlns:ma14="http://schemas.microsoft.com/office/mac/drawingml/2011/main" val="1"/>
             </a:ext>
           </a:extLst>
         </p:spPr>
@@ -13585,7 +13590,7 @@
           </a:ln>
           <a:extLst>
             <a:ext uri="{C572A759-6A51-4108-AA02-DFA0A04FC94B}">
-              <ma14:wrappingTextBoxFlag xmlns:ma14="http://schemas.microsoft.com/office/mac/drawingml/2011/main" xmlns="" val="1"/>
+              <ma14:wrappingTextBoxFlag xmlns="" xmlns:ma14="http://schemas.microsoft.com/office/mac/drawingml/2011/main" val="1"/>
             </a:ext>
           </a:extLst>
         </p:spPr>
@@ -13632,7 +13637,7 @@
           </a:ln>
           <a:extLst>
             <a:ext uri="{C572A759-6A51-4108-AA02-DFA0A04FC94B}">
-              <ma14:wrappingTextBoxFlag xmlns:ma14="http://schemas.microsoft.com/office/mac/drawingml/2011/main" xmlns="" val="1"/>
+              <ma14:wrappingTextBoxFlag xmlns="" xmlns:ma14="http://schemas.microsoft.com/office/mac/drawingml/2011/main" val="1"/>
             </a:ext>
           </a:extLst>
         </p:spPr>
@@ -13743,7 +13748,7 @@
           </a:ln>
           <a:extLst>
             <a:ext uri="{C572A759-6A51-4108-AA02-DFA0A04FC94B}">
-              <ma14:wrappingTextBoxFlag xmlns:ma14="http://schemas.microsoft.com/office/mac/drawingml/2011/main" xmlns="" val="1"/>
+              <ma14:wrappingTextBoxFlag xmlns="" xmlns:ma14="http://schemas.microsoft.com/office/mac/drawingml/2011/main" val="1"/>
             </a:ext>
           </a:extLst>
         </p:spPr>
@@ -14076,7 +14081,7 @@
           </a:ln>
           <a:extLst>
             <a:ext uri="{C572A759-6A51-4108-AA02-DFA0A04FC94B}">
-              <ma14:wrappingTextBoxFlag xmlns:ma14="http://schemas.microsoft.com/office/mac/drawingml/2011/main" xmlns="" val="1"/>
+              <ma14:wrappingTextBoxFlag xmlns="" xmlns:ma14="http://schemas.microsoft.com/office/mac/drawingml/2011/main" val="1"/>
             </a:ext>
           </a:extLst>
         </p:spPr>
@@ -14120,7 +14125,7 @@
           </a:ln>
           <a:extLst>
             <a:ext uri="{C572A759-6A51-4108-AA02-DFA0A04FC94B}">
-              <ma14:wrappingTextBoxFlag xmlns:ma14="http://schemas.microsoft.com/office/mac/drawingml/2011/main" xmlns="" val="1"/>
+              <ma14:wrappingTextBoxFlag xmlns="" xmlns:ma14="http://schemas.microsoft.com/office/mac/drawingml/2011/main" val="1"/>
             </a:ext>
           </a:extLst>
         </p:spPr>
@@ -14167,7 +14172,7 @@
           </a:ln>
           <a:extLst>
             <a:ext uri="{C572A759-6A51-4108-AA02-DFA0A04FC94B}">
-              <ma14:wrappingTextBoxFlag xmlns:ma14="http://schemas.microsoft.com/office/mac/drawingml/2011/main" xmlns="" val="1"/>
+              <ma14:wrappingTextBoxFlag xmlns="" xmlns:ma14="http://schemas.microsoft.com/office/mac/drawingml/2011/main" val="1"/>
             </a:ext>
           </a:extLst>
         </p:spPr>
@@ -14314,7 +14319,7 @@
           </a:ln>
           <a:extLst>
             <a:ext uri="{C572A759-6A51-4108-AA02-DFA0A04FC94B}">
-              <ma14:wrappingTextBoxFlag xmlns:ma14="http://schemas.microsoft.com/office/mac/drawingml/2011/main" xmlns="" val="1"/>
+              <ma14:wrappingTextBoxFlag xmlns="" xmlns:ma14="http://schemas.microsoft.com/office/mac/drawingml/2011/main" val="1"/>
             </a:ext>
           </a:extLst>
         </p:spPr>
@@ -14358,7 +14363,7 @@
           </a:ln>
           <a:extLst>
             <a:ext uri="{C572A759-6A51-4108-AA02-DFA0A04FC94B}">
-              <ma14:wrappingTextBoxFlag xmlns:ma14="http://schemas.microsoft.com/office/mac/drawingml/2011/main" xmlns="" val="1"/>
+              <ma14:wrappingTextBoxFlag xmlns="" xmlns:ma14="http://schemas.microsoft.com/office/mac/drawingml/2011/main" val="1"/>
             </a:ext>
           </a:extLst>
         </p:spPr>
@@ -14405,7 +14410,7 @@
           </a:ln>
           <a:extLst>
             <a:ext uri="{C572A759-6A51-4108-AA02-DFA0A04FC94B}">
-              <ma14:wrappingTextBoxFlag xmlns:ma14="http://schemas.microsoft.com/office/mac/drawingml/2011/main" xmlns="" val="1"/>
+              <ma14:wrappingTextBoxFlag xmlns="" xmlns:ma14="http://schemas.microsoft.com/office/mac/drawingml/2011/main" val="1"/>
             </a:ext>
           </a:extLst>
         </p:spPr>
@@ -14552,7 +14557,7 @@
           </a:ln>
           <a:extLst>
             <a:ext uri="{C572A759-6A51-4108-AA02-DFA0A04FC94B}">
-              <ma14:wrappingTextBoxFlag xmlns:ma14="http://schemas.microsoft.com/office/mac/drawingml/2011/main" xmlns="" val="1"/>
+              <ma14:wrappingTextBoxFlag xmlns="" xmlns:ma14="http://schemas.microsoft.com/office/mac/drawingml/2011/main" val="1"/>
             </a:ext>
           </a:extLst>
         </p:spPr>
@@ -14596,7 +14601,7 @@
           </a:ln>
           <a:extLst>
             <a:ext uri="{C572A759-6A51-4108-AA02-DFA0A04FC94B}">
-              <ma14:wrappingTextBoxFlag xmlns:ma14="http://schemas.microsoft.com/office/mac/drawingml/2011/main" xmlns="" val="1"/>
+              <ma14:wrappingTextBoxFlag xmlns="" xmlns:ma14="http://schemas.microsoft.com/office/mac/drawingml/2011/main" val="1"/>
             </a:ext>
           </a:extLst>
         </p:spPr>
@@ -14643,7 +14648,7 @@
           </a:ln>
           <a:extLst>
             <a:ext uri="{C572A759-6A51-4108-AA02-DFA0A04FC94B}">
-              <ma14:wrappingTextBoxFlag xmlns:ma14="http://schemas.microsoft.com/office/mac/drawingml/2011/main" xmlns="" val="1"/>
+              <ma14:wrappingTextBoxFlag xmlns="" xmlns:ma14="http://schemas.microsoft.com/office/mac/drawingml/2011/main" val="1"/>
             </a:ext>
           </a:extLst>
         </p:spPr>
@@ -14697,7 +14702,7 @@
           </a:ln>
           <a:extLst>
             <a:ext uri="{C572A759-6A51-4108-AA02-DFA0A04FC94B}">
-              <ma14:wrappingTextBoxFlag xmlns:ma14="http://schemas.microsoft.com/office/mac/drawingml/2011/main" xmlns="" val="1"/>
+              <ma14:wrappingTextBoxFlag xmlns="" xmlns:ma14="http://schemas.microsoft.com/office/mac/drawingml/2011/main" val="1"/>
             </a:ext>
           </a:extLst>
         </p:spPr>
@@ -14925,7 +14930,7 @@
           </a:ln>
           <a:extLst>
             <a:ext uri="{C572A759-6A51-4108-AA02-DFA0A04FC94B}">
-              <ma14:wrappingTextBoxFlag xmlns:ma14="http://schemas.microsoft.com/office/mac/drawingml/2011/main" xmlns="" val="1"/>
+              <ma14:wrappingTextBoxFlag xmlns="" xmlns:ma14="http://schemas.microsoft.com/office/mac/drawingml/2011/main" val="1"/>
             </a:ext>
           </a:extLst>
         </p:spPr>
@@ -15035,7 +15040,7 @@
           </a:ln>
           <a:extLst>
             <a:ext uri="{C572A759-6A51-4108-AA02-DFA0A04FC94B}">
-              <ma14:wrappingTextBoxFlag xmlns:ma14="http://schemas.microsoft.com/office/mac/drawingml/2011/main" xmlns="" val="1"/>
+              <ma14:wrappingTextBoxFlag xmlns="" xmlns:ma14="http://schemas.microsoft.com/office/mac/drawingml/2011/main" val="1"/>
             </a:ext>
           </a:extLst>
         </p:spPr>
@@ -15203,7 +15208,7 @@
           </a:ln>
           <a:extLst>
             <a:ext uri="{C572A759-6A51-4108-AA02-DFA0A04FC94B}">
-              <ma14:wrappingTextBoxFlag xmlns:ma14="http://schemas.microsoft.com/office/mac/drawingml/2011/main" xmlns="" val="1"/>
+              <ma14:wrappingTextBoxFlag xmlns="" xmlns:ma14="http://schemas.microsoft.com/office/mac/drawingml/2011/main" val="1"/>
             </a:ext>
           </a:extLst>
         </p:spPr>
@@ -15247,7 +15252,7 @@
           </a:ln>
           <a:extLst>
             <a:ext uri="{C572A759-6A51-4108-AA02-DFA0A04FC94B}">
-              <ma14:wrappingTextBoxFlag xmlns:ma14="http://schemas.microsoft.com/office/mac/drawingml/2011/main" xmlns="" val="1"/>
+              <ma14:wrappingTextBoxFlag xmlns="" xmlns:ma14="http://schemas.microsoft.com/office/mac/drawingml/2011/main" val="1"/>
             </a:ext>
           </a:extLst>
         </p:spPr>
@@ -15294,7 +15299,7 @@
           </a:ln>
           <a:extLst>
             <a:ext uri="{C572A759-6A51-4108-AA02-DFA0A04FC94B}">
-              <ma14:wrappingTextBoxFlag xmlns:ma14="http://schemas.microsoft.com/office/mac/drawingml/2011/main" xmlns="" val="1"/>
+              <ma14:wrappingTextBoxFlag xmlns="" xmlns:ma14="http://schemas.microsoft.com/office/mac/drawingml/2011/main" val="1"/>
             </a:ext>
           </a:extLst>
         </p:spPr>
@@ -15527,7 +15532,7 @@
           </a:ln>
           <a:extLst>
             <a:ext uri="{C572A759-6A51-4108-AA02-DFA0A04FC94B}">
-              <ma14:wrappingTextBoxFlag xmlns:ma14="http://schemas.microsoft.com/office/mac/drawingml/2011/main" xmlns="" val="1"/>
+              <ma14:wrappingTextBoxFlag xmlns="" xmlns:ma14="http://schemas.microsoft.com/office/mac/drawingml/2011/main" val="1"/>
             </a:ext>
           </a:extLst>
         </p:spPr>
@@ -15635,7 +15640,7 @@
           </a:ln>
           <a:extLst>
             <a:ext uri="{C572A759-6A51-4108-AA02-DFA0A04FC94B}">
-              <ma14:wrappingTextBoxFlag xmlns:ma14="http://schemas.microsoft.com/office/mac/drawingml/2011/main" xmlns="" val="1"/>
+              <ma14:wrappingTextBoxFlag xmlns="" xmlns:ma14="http://schemas.microsoft.com/office/mac/drawingml/2011/main" val="1"/>
             </a:ext>
           </a:extLst>
         </p:spPr>
@@ -15712,7 +15717,7 @@
           </a:ln>
           <a:extLst>
             <a:ext uri="{C572A759-6A51-4108-AA02-DFA0A04FC94B}">
-              <ma14:wrappingTextBoxFlag xmlns:ma14="http://schemas.microsoft.com/office/mac/drawingml/2011/main" xmlns="" val="1"/>
+              <ma14:wrappingTextBoxFlag xmlns="" xmlns:ma14="http://schemas.microsoft.com/office/mac/drawingml/2011/main" val="1"/>
             </a:ext>
           </a:extLst>
         </p:spPr>
@@ -15820,7 +15825,7 @@
           </a:ln>
           <a:extLst>
             <a:ext uri="{C572A759-6A51-4108-AA02-DFA0A04FC94B}">
-              <ma14:wrappingTextBoxFlag xmlns:ma14="http://schemas.microsoft.com/office/mac/drawingml/2011/main" xmlns="" val="1"/>
+              <ma14:wrappingTextBoxFlag xmlns="" xmlns:ma14="http://schemas.microsoft.com/office/mac/drawingml/2011/main" val="1"/>
             </a:ext>
           </a:extLst>
         </p:spPr>
@@ -15897,7 +15902,7 @@
           </a:ln>
           <a:extLst>
             <a:ext uri="{C572A759-6A51-4108-AA02-DFA0A04FC94B}">
-              <ma14:wrappingTextBoxFlag xmlns:ma14="http://schemas.microsoft.com/office/mac/drawingml/2011/main" xmlns="" val="1"/>
+              <ma14:wrappingTextBoxFlag xmlns="" xmlns:ma14="http://schemas.microsoft.com/office/mac/drawingml/2011/main" val="1"/>
             </a:ext>
           </a:extLst>
         </p:spPr>
@@ -15944,7 +15949,7 @@
           </a:ln>
           <a:extLst>
             <a:ext uri="{C572A759-6A51-4108-AA02-DFA0A04FC94B}">
-              <ma14:wrappingTextBoxFlag xmlns:ma14="http://schemas.microsoft.com/office/mac/drawingml/2011/main" xmlns="" val="1"/>
+              <ma14:wrappingTextBoxFlag xmlns="" xmlns:ma14="http://schemas.microsoft.com/office/mac/drawingml/2011/main" val="1"/>
             </a:ext>
           </a:extLst>
         </p:spPr>
@@ -16129,7 +16134,7 @@
           </a:ln>
           <a:extLst>
             <a:ext uri="{C572A759-6A51-4108-AA02-DFA0A04FC94B}">
-              <ma14:wrappingTextBoxFlag xmlns:ma14="http://schemas.microsoft.com/office/mac/drawingml/2011/main" xmlns="" val="1"/>
+              <ma14:wrappingTextBoxFlag xmlns="" xmlns:ma14="http://schemas.microsoft.com/office/mac/drawingml/2011/main" val="1"/>
             </a:ext>
           </a:extLst>
         </p:spPr>
@@ -16189,49 +16194,43 @@
       </p:grpSpPr>
       <p:sp>
         <p:nvSpPr>
-          <p:cNvPr id="428" name="Shape 720"/>
-          <p:cNvSpPr/>
-          <p:nvPr/>
-        </p:nvSpPr>
-        <p:spPr>
-          <a:xfrm>
-            <a:off x="1739900" y="-114302"/>
-            <a:ext cx="2093911" cy="1649417"/>
-          </a:xfrm>
-          <a:prstGeom prst="rect">
-            <a:avLst/>
-          </a:prstGeom>
-          <a:solidFill>
-            <a:srgbClr val="0070C0"/>
-          </a:solidFill>
-          <a:ln w="12700">
-            <a:solidFill>
-              <a:srgbClr val="FFFFFF"/>
-            </a:solidFill>
-            <a:miter/>
-          </a:ln>
-        </p:spPr>
-        <p:txBody>
-          <a:bodyPr lIns="45718" tIns="45718" rIns="45718" bIns="45718" anchor="ctr"/>
+          <p:cNvPr id="2" name="标题 1"/>
+          <p:cNvSpPr>
+            <a:spLocks noGrp="1"/>
+          </p:cNvSpPr>
+          <p:nvPr>
+            <p:ph type="title"/>
+          </p:nvPr>
+        </p:nvSpPr>
+        <p:spPr/>
+        <p:txBody>
+          <a:bodyPr/>
           <a:lstStyle/>
           <a:p>
-            <a:pPr algn="ctr">
-              <a:defRPr sz="1800" b="0"/>
-            </a:pPr>
-            <a:endParaRPr/>
-          </a:p>
-        </p:txBody>
-      </p:sp>
-      <p:sp>
-        <p:nvSpPr>
-          <p:cNvPr id="429" name="Shape 721"/>
+            <a:r>
+              <a:rPr lang="zh-CN" altLang="en-US" dirty="0" smtClean="0">
+                <a:latin typeface="黑体" panose="02010609060101010101" pitchFamily="49" charset="-122"/>
+                <a:ea typeface="黑体" panose="02010609060101010101" pitchFamily="49" charset="-122"/>
+              </a:rPr>
+              <a:t>实验</a:t>
+            </a:r>
+            <a:endParaRPr lang="zh-CN" altLang="en-US" dirty="0">
+              <a:latin typeface="黑体" panose="02010609060101010101" pitchFamily="49" charset="-122"/>
+              <a:ea typeface="黑体" panose="02010609060101010101" pitchFamily="49" charset="-122"/>
+            </a:endParaRPr>
+          </a:p>
+        </p:txBody>
+      </p:sp>
+      <p:sp>
+        <p:nvSpPr>
+          <p:cNvPr id="3" name="Limitation…"/>
           <p:cNvSpPr txBox="1"/>
           <p:nvPr/>
         </p:nvSpPr>
         <p:spPr>
           <a:xfrm>
-            <a:off x="2002026" y="520996"/>
-            <a:ext cx="1475739" cy="916939"/>
+            <a:off x="1627113" y="1691239"/>
+            <a:ext cx="9020110" cy="1344082"/>
           </a:xfrm>
           <a:prstGeom prst="rect">
             <a:avLst/>
@@ -16241,86 +16240,7 @@
           </a:ln>
           <a:extLst>
             <a:ext uri="{C572A759-6A51-4108-AA02-DFA0A04FC94B}">
-              <ma14:wrappingTextBoxFlag xmlns:ma14="http://schemas.microsoft.com/office/mac/drawingml/2011/main" xmlns="" val="1"/>
-            </a:ext>
-          </a:extLst>
-        </p:spPr>
-        <p:txBody>
-          <a:bodyPr wrap="none" lIns="45718" tIns="45718" rIns="45718" bIns="45718">
-            <a:spAutoFit/>
-          </a:bodyPr>
-          <a:lstStyle>
-            <a:lvl1pPr>
-              <a:defRPr sz="5400">
-                <a:latin typeface="方正超粗黑_GBK"/>
-                <a:ea typeface="方正超粗黑_GBK"/>
-                <a:cs typeface="方正超粗黑_GBK"/>
-                <a:sym typeface="方正超粗黑_GBK"/>
-              </a:defRPr>
-            </a:lvl1pPr>
-          </a:lstStyle>
-          <a:p>
-            <a:r>
-              <a:t>REF</a:t>
-            </a:r>
-          </a:p>
-        </p:txBody>
-      </p:sp>
-      <p:sp>
-        <p:nvSpPr>
-          <p:cNvPr id="430" name="Shape 722"/>
-          <p:cNvSpPr/>
-          <p:nvPr/>
-        </p:nvSpPr>
-        <p:spPr>
-          <a:xfrm>
-            <a:off x="1739900" y="6477000"/>
-            <a:ext cx="2093911" cy="1649415"/>
-          </a:xfrm>
-          <a:prstGeom prst="rect">
-            <a:avLst/>
-          </a:prstGeom>
-          <a:solidFill>
-            <a:srgbClr val="0070C0"/>
-          </a:solidFill>
-          <a:ln w="12700">
-            <a:solidFill>
-              <a:srgbClr val="FFFFFF"/>
-            </a:solidFill>
-            <a:miter/>
-          </a:ln>
-        </p:spPr>
-        <p:txBody>
-          <a:bodyPr lIns="45718" tIns="45718" rIns="45718" bIns="45718" anchor="ctr"/>
-          <a:lstStyle/>
-          <a:p>
-            <a:pPr algn="ctr">
-              <a:defRPr sz="1800" b="0"/>
-            </a:pPr>
-            <a:endParaRPr/>
-          </a:p>
-        </p:txBody>
-      </p:sp>
-      <p:sp>
-        <p:nvSpPr>
-          <p:cNvPr id="431" name="Shape 384"/>
-          <p:cNvSpPr txBox="1"/>
-          <p:nvPr/>
-        </p:nvSpPr>
-        <p:spPr>
-          <a:xfrm>
-            <a:off x="1739900" y="2170412"/>
-            <a:ext cx="9797293" cy="3277816"/>
-          </a:xfrm>
-          <a:prstGeom prst="rect">
-            <a:avLst/>
-          </a:prstGeom>
-          <a:ln w="12700">
-            <a:miter lim="400000"/>
-          </a:ln>
-          <a:extLst>
-            <a:ext uri="{C572A759-6A51-4108-AA02-DFA0A04FC94B}">
-              <ma14:wrappingTextBoxFlag xmlns:ma14="http://schemas.microsoft.com/office/mac/drawingml/2011/main" xmlns="" val="1"/>
+              <ma14:wrappingTextBoxFlag xmlns="" xmlns:ma14="http://schemas.microsoft.com/office/mac/drawingml/2011/main" val="1"/>
             </a:ext>
           </a:extLst>
         </p:spPr>
@@ -16330,145 +16250,69 @@
           </a:bodyPr>
           <a:lstStyle/>
           <a:p>
-            <a:pPr marL="307473" indent="-307473" algn="l">
-              <a:buSzPct val="100000"/>
-              <a:buAutoNum type="arabicPeriod"/>
-              <a:defRPr sz="2300" b="0">
-                <a:solidFill>
-                  <a:srgbClr val="0070C0"/>
-                </a:solidFill>
-                <a:latin typeface="黑体"/>
-                <a:ea typeface="黑体"/>
-                <a:cs typeface="黑体"/>
-                <a:sym typeface="黑体"/>
+            <a:pPr algn="l" defTabSz="457200">
+              <a:lnSpc>
+                <a:spcPts val="4500"/>
+              </a:lnSpc>
+              <a:spcBef>
+                <a:spcPts val="1200"/>
+              </a:spcBef>
+              <a:defRPr sz="2600" b="0">
+                <a:solidFill>
+                  <a:srgbClr val="000000"/>
+                </a:solidFill>
+                <a:latin typeface="+mj-lt"/>
+                <a:ea typeface="+mj-ea"/>
+                <a:cs typeface="+mj-cs"/>
+                <a:sym typeface="Calibri Light"/>
               </a:defRPr>
             </a:pPr>
             <a:r>
-              <a:rPr dirty="0">
+              <a:rPr lang="en-US" altLang="zh-CN" dirty="0" smtClean="0"/>
+              <a:t>1. Android APK</a:t>
+            </a:r>
+            <a:r>
+              <a:rPr lang="zh-CN" altLang="en-US" dirty="0" smtClean="0"/>
+              <a:t>文件的反编译</a:t>
+            </a:r>
+            <a:endParaRPr lang="en-US" altLang="zh-CN" dirty="0" smtClean="0"/>
+          </a:p>
+          <a:p>
+            <a:pPr algn="l" defTabSz="457200">
+              <a:lnSpc>
+                <a:spcPts val="4500"/>
+              </a:lnSpc>
+              <a:spcBef>
+                <a:spcPts val="1200"/>
+              </a:spcBef>
+              <a:defRPr sz="2600" b="0">
                 <a:solidFill>
                   <a:srgbClr val="000000"/>
                 </a:solidFill>
-              </a:rPr>
-              <a:t>Achieving Accuracy and Scalability Simultaneously in Detecting Application Clones on Android Markets</a:t>
-            </a:r>
-          </a:p>
-          <a:p>
-            <a:pPr algn="l">
-              <a:defRPr sz="2300" b="0">
-                <a:solidFill>
-                  <a:srgbClr val="0070C0"/>
-                </a:solidFill>
-                <a:latin typeface="黑体"/>
-                <a:ea typeface="黑体"/>
-                <a:cs typeface="黑体"/>
-                <a:sym typeface="黑体"/>
+                <a:latin typeface="+mj-lt"/>
+                <a:ea typeface="+mj-ea"/>
+                <a:cs typeface="+mj-cs"/>
+                <a:sym typeface="Calibri Light"/>
               </a:defRPr>
             </a:pPr>
-            <a:endParaRPr dirty="0">
-              <a:solidFill>
-                <a:srgbClr val="000000"/>
-              </a:solidFill>
-            </a:endParaRPr>
-          </a:p>
-          <a:p>
-            <a:pPr marL="307473" indent="-307473" algn="l">
-              <a:buSzPct val="100000"/>
-              <a:buAutoNum type="arabicPeriod" startAt="2"/>
-              <a:defRPr sz="2300" b="0">
-                <a:solidFill>
-                  <a:srgbClr val="0070C0"/>
-                </a:solidFill>
-                <a:latin typeface="黑体"/>
-                <a:ea typeface="黑体"/>
-                <a:cs typeface="黑体"/>
-                <a:sym typeface="黑体"/>
-              </a:defRPr>
-            </a:pPr>
-            <a:r>
-              <a:rPr dirty="0">
-                <a:solidFill>
-                  <a:srgbClr val="000000"/>
-                </a:solidFill>
-              </a:rPr>
-              <a:t>On Finding Duplication and Near-Duplication in Large Software System</a:t>
-            </a:r>
-          </a:p>
-          <a:p>
-            <a:pPr algn="l">
-              <a:defRPr sz="2300" b="0">
-                <a:solidFill>
-                  <a:srgbClr val="0070C0"/>
-                </a:solidFill>
-                <a:latin typeface="黑体"/>
-                <a:ea typeface="黑体"/>
-                <a:cs typeface="黑体"/>
-                <a:sym typeface="黑体"/>
-              </a:defRPr>
-            </a:pPr>
-            <a:endParaRPr dirty="0">
-              <a:solidFill>
-                <a:srgbClr val="000000"/>
-              </a:solidFill>
-            </a:endParaRPr>
-          </a:p>
-          <a:p>
-            <a:pPr marL="307473" indent="-307473" algn="l">
-              <a:buSzPct val="100000"/>
-              <a:buAutoNum type="arabicPeriod" startAt="3"/>
-              <a:defRPr sz="2300" b="0">
-                <a:solidFill>
-                  <a:srgbClr val="0070C0"/>
-                </a:solidFill>
-                <a:latin typeface="黑体"/>
-                <a:ea typeface="黑体"/>
-                <a:cs typeface="黑体"/>
-                <a:sym typeface="黑体"/>
-              </a:defRPr>
-            </a:pPr>
-            <a:r>
-              <a:rPr dirty="0" err="1">
-                <a:solidFill>
-                  <a:srgbClr val="000000"/>
-                </a:solidFill>
-              </a:rPr>
-              <a:t>CCFinder</a:t>
-            </a:r>
-            <a:r>
-              <a:rPr dirty="0">
-                <a:solidFill>
-                  <a:srgbClr val="000000"/>
-                </a:solidFill>
-              </a:rPr>
-              <a:t>: A </a:t>
-            </a:r>
-            <a:r>
-              <a:rPr dirty="0" err="1">
-                <a:solidFill>
-                  <a:srgbClr val="000000"/>
-                </a:solidFill>
-              </a:rPr>
-              <a:t>Multilinguistic</a:t>
-            </a:r>
-            <a:r>
-              <a:rPr dirty="0">
-                <a:solidFill>
-                  <a:srgbClr val="000000"/>
-                </a:solidFill>
-              </a:rPr>
-              <a:t> Token-Based Code Clone Detection System for Large Scale Source Code</a:t>
-            </a:r>
-            <a:r>
-              <a:rPr dirty="0"/>
-              <a:t/>
-            </a:r>
-            <a:br>
-              <a:rPr dirty="0"/>
-            </a:br>
-            <a:endParaRPr dirty="0"/>
+            <a:r>
+              <a:rPr lang="en-US" altLang="zh-CN" dirty="0" smtClean="0"/>
+              <a:t>2. APK</a:t>
+            </a:r>
+            <a:r>
+              <a:rPr lang="zh-CN" altLang="en-US" dirty="0" smtClean="0"/>
+              <a:t>文件的爬取</a:t>
+            </a:r>
+            <a:endParaRPr lang="en-US" altLang="zh-CN" dirty="0" smtClean="0"/>
           </a:p>
         </p:txBody>
       </p:sp>
     </p:spTree>
+    <p:extLst>
+      <p:ext uri="{BB962C8B-B14F-4D97-AF65-F5344CB8AC3E}">
+        <p14:creationId xmlns:p14="http://schemas.microsoft.com/office/powerpoint/2010/main" val="2040011828"/>
+      </p:ext>
+    </p:extLst>
   </p:cSld>
   <p:clrMapOvr>
     <a:masterClrMapping/>
@@ -16503,7 +16347,2467 @@
       </p:grpSpPr>
       <p:sp>
         <p:nvSpPr>
-          <p:cNvPr id="433" name="Shape 732"/>
+          <p:cNvPr id="2" name="标题 1"/>
+          <p:cNvSpPr>
+            <a:spLocks noGrp="1"/>
+          </p:cNvSpPr>
+          <p:nvPr>
+            <p:ph type="title"/>
+          </p:nvPr>
+        </p:nvSpPr>
+        <p:spPr/>
+        <p:txBody>
+          <a:bodyPr/>
+          <a:lstStyle/>
+          <a:p>
+            <a:r>
+              <a:rPr lang="zh-CN" altLang="en-US" dirty="0" smtClean="0">
+                <a:latin typeface="黑体" panose="02010609060101010101" pitchFamily="49" charset="-122"/>
+                <a:ea typeface="黑体" panose="02010609060101010101" pitchFamily="49" charset="-122"/>
+              </a:rPr>
+              <a:t>实验</a:t>
+            </a:r>
+            <a:endParaRPr lang="zh-CN" altLang="en-US" dirty="0">
+              <a:latin typeface="黑体" panose="02010609060101010101" pitchFamily="49" charset="-122"/>
+              <a:ea typeface="黑体" panose="02010609060101010101" pitchFamily="49" charset="-122"/>
+            </a:endParaRPr>
+          </a:p>
+        </p:txBody>
+      </p:sp>
+      <p:sp>
+        <p:nvSpPr>
+          <p:cNvPr id="3" name="Limitation…"/>
+          <p:cNvSpPr txBox="1"/>
+          <p:nvPr/>
+        </p:nvSpPr>
+        <p:spPr>
+          <a:xfrm>
+            <a:off x="1627113" y="1691239"/>
+            <a:ext cx="9020110" cy="611254"/>
+          </a:xfrm>
+          <a:prstGeom prst="rect">
+            <a:avLst/>
+          </a:prstGeom>
+          <a:ln w="12700">
+            <a:miter lim="400000"/>
+          </a:ln>
+          <a:extLst>
+            <a:ext uri="{C572A759-6A51-4108-AA02-DFA0A04FC94B}">
+              <ma14:wrappingTextBoxFlag xmlns="" xmlns:ma14="http://schemas.microsoft.com/office/mac/drawingml/2011/main" val="1"/>
+            </a:ext>
+          </a:extLst>
+        </p:spPr>
+        <p:txBody>
+          <a:bodyPr lIns="45718" tIns="45718" rIns="45718" bIns="45718">
+            <a:spAutoFit/>
+          </a:bodyPr>
+          <a:lstStyle/>
+          <a:p>
+            <a:pPr algn="l" defTabSz="457200">
+              <a:lnSpc>
+                <a:spcPts val="4500"/>
+              </a:lnSpc>
+              <a:spcBef>
+                <a:spcPts val="1200"/>
+              </a:spcBef>
+              <a:defRPr sz="2600" b="0">
+                <a:solidFill>
+                  <a:srgbClr val="000000"/>
+                </a:solidFill>
+                <a:latin typeface="+mj-lt"/>
+                <a:ea typeface="+mj-ea"/>
+                <a:cs typeface="+mj-cs"/>
+                <a:sym typeface="Calibri Light"/>
+              </a:defRPr>
+            </a:pPr>
+            <a:r>
+              <a:rPr lang="en-US" altLang="zh-CN" dirty="0" smtClean="0"/>
+              <a:t>1. Android APK</a:t>
+            </a:r>
+            <a:r>
+              <a:rPr lang="zh-CN" altLang="en-US" dirty="0" smtClean="0"/>
+              <a:t>文件的反编译</a:t>
+            </a:r>
+          </a:p>
+        </p:txBody>
+      </p:sp>
+      <p:sp>
+        <p:nvSpPr>
+          <p:cNvPr id="5" name="Limitation…"/>
+          <p:cNvSpPr txBox="1"/>
+          <p:nvPr/>
+        </p:nvSpPr>
+        <p:spPr>
+          <a:xfrm>
+            <a:off x="2886900" y="2718009"/>
+            <a:ext cx="1327072" cy="669410"/>
+          </a:xfrm>
+          <a:prstGeom prst="rect">
+            <a:avLst/>
+          </a:prstGeom>
+          <a:ln w="12700">
+            <a:miter lim="400000"/>
+          </a:ln>
+          <a:extLst>
+            <a:ext uri="{C572A759-6A51-4108-AA02-DFA0A04FC94B}">
+              <ma14:wrappingTextBoxFlag xmlns="" xmlns:ma14="http://schemas.microsoft.com/office/mac/drawingml/2011/main" val="1"/>
+            </a:ext>
+          </a:extLst>
+        </p:spPr>
+        <p:txBody>
+          <a:bodyPr wrap="square" lIns="45718" tIns="45718" rIns="45718" bIns="45718">
+            <a:spAutoFit/>
+          </a:bodyPr>
+          <a:lstStyle/>
+          <a:p>
+            <a:pPr algn="l" defTabSz="457200">
+              <a:lnSpc>
+                <a:spcPts val="4500"/>
+              </a:lnSpc>
+              <a:spcBef>
+                <a:spcPts val="1200"/>
+              </a:spcBef>
+              <a:defRPr sz="2600" b="0">
+                <a:solidFill>
+                  <a:srgbClr val="000000"/>
+                </a:solidFill>
+                <a:latin typeface="+mj-lt"/>
+                <a:ea typeface="+mj-ea"/>
+                <a:cs typeface="+mj-cs"/>
+                <a:sym typeface="Calibri Light"/>
+              </a:defRPr>
+            </a:pPr>
+            <a:r>
+              <a:rPr lang="en-US" altLang="zh-CN" dirty="0" smtClean="0"/>
+              <a:t>APK</a:t>
+            </a:r>
+            <a:r>
+              <a:rPr lang="zh-CN" altLang="en-US" dirty="0" smtClean="0"/>
+              <a:t>文件</a:t>
+            </a:r>
+          </a:p>
+        </p:txBody>
+      </p:sp>
+      <p:sp>
+        <p:nvSpPr>
+          <p:cNvPr id="6" name="Limitation…"/>
+          <p:cNvSpPr txBox="1"/>
+          <p:nvPr/>
+        </p:nvSpPr>
+        <p:spPr>
+          <a:xfrm>
+            <a:off x="3669281" y="3684784"/>
+            <a:ext cx="1982590" cy="669410"/>
+          </a:xfrm>
+          <a:prstGeom prst="rect">
+            <a:avLst/>
+          </a:prstGeom>
+          <a:ln w="12700">
+            <a:miter lim="400000"/>
+          </a:ln>
+          <a:extLst>
+            <a:ext uri="{C572A759-6A51-4108-AA02-DFA0A04FC94B}">
+              <ma14:wrappingTextBoxFlag xmlns="" xmlns:ma14="http://schemas.microsoft.com/office/mac/drawingml/2011/main" val="1"/>
+            </a:ext>
+          </a:extLst>
+        </p:spPr>
+        <p:txBody>
+          <a:bodyPr wrap="square" lIns="45718" tIns="45718" rIns="45718" bIns="45718">
+            <a:spAutoFit/>
+          </a:bodyPr>
+          <a:lstStyle/>
+          <a:p>
+            <a:pPr algn="l" defTabSz="457200">
+              <a:lnSpc>
+                <a:spcPts val="4500"/>
+              </a:lnSpc>
+              <a:spcBef>
+                <a:spcPts val="1200"/>
+              </a:spcBef>
+              <a:defRPr sz="2600" b="0">
+                <a:solidFill>
+                  <a:srgbClr val="000000"/>
+                </a:solidFill>
+                <a:latin typeface="+mj-lt"/>
+                <a:ea typeface="+mj-ea"/>
+                <a:cs typeface="+mj-cs"/>
+                <a:sym typeface="Calibri Light"/>
+              </a:defRPr>
+            </a:pPr>
+            <a:r>
+              <a:rPr lang="en-US" altLang="zh-CN" dirty="0" err="1"/>
+              <a:t>a</a:t>
+            </a:r>
+            <a:r>
+              <a:rPr lang="en-US" altLang="zh-CN" dirty="0" err="1" smtClean="0"/>
+              <a:t>pktool</a:t>
+            </a:r>
+            <a:r>
+              <a:rPr lang="zh-CN" altLang="en-US" dirty="0" smtClean="0"/>
+              <a:t>解压</a:t>
+            </a:r>
+          </a:p>
+        </p:txBody>
+      </p:sp>
+      <p:sp>
+        <p:nvSpPr>
+          <p:cNvPr id="7" name="Limitation…"/>
+          <p:cNvSpPr txBox="1"/>
+          <p:nvPr/>
+        </p:nvSpPr>
+        <p:spPr>
+          <a:xfrm>
+            <a:off x="5095508" y="2744135"/>
+            <a:ext cx="1327072" cy="611254"/>
+          </a:xfrm>
+          <a:prstGeom prst="rect">
+            <a:avLst/>
+          </a:prstGeom>
+          <a:ln w="12700">
+            <a:miter lim="400000"/>
+          </a:ln>
+          <a:extLst>
+            <a:ext uri="{C572A759-6A51-4108-AA02-DFA0A04FC94B}">
+              <ma14:wrappingTextBoxFlag xmlns="" xmlns:ma14="http://schemas.microsoft.com/office/mac/drawingml/2011/main" val="1"/>
+            </a:ext>
+          </a:extLst>
+        </p:spPr>
+        <p:txBody>
+          <a:bodyPr wrap="square" lIns="45718" tIns="45718" rIns="45718" bIns="45718">
+            <a:spAutoFit/>
+          </a:bodyPr>
+          <a:lstStyle/>
+          <a:p>
+            <a:pPr algn="l" defTabSz="457200">
+              <a:lnSpc>
+                <a:spcPts val="4500"/>
+              </a:lnSpc>
+              <a:spcBef>
+                <a:spcPts val="1200"/>
+              </a:spcBef>
+              <a:defRPr sz="2600" b="0">
+                <a:solidFill>
+                  <a:srgbClr val="000000"/>
+                </a:solidFill>
+                <a:latin typeface="+mj-lt"/>
+                <a:ea typeface="+mj-ea"/>
+                <a:cs typeface="+mj-cs"/>
+                <a:sym typeface="Calibri Light"/>
+              </a:defRPr>
+            </a:pPr>
+            <a:r>
+              <a:rPr lang="en-US" altLang="zh-CN" sz="2600" b="0" dirty="0" err="1">
+                <a:solidFill>
+                  <a:srgbClr val="000000"/>
+                </a:solidFill>
+                <a:sym typeface="Calibri Light"/>
+              </a:rPr>
+              <a:t>dex</a:t>
+            </a:r>
+            <a:r>
+              <a:rPr lang="zh-CN" altLang="en-US" sz="2600" b="0" dirty="0">
+                <a:solidFill>
+                  <a:srgbClr val="000000"/>
+                </a:solidFill>
+                <a:sym typeface="Calibri Light"/>
+              </a:rPr>
+              <a:t>文件</a:t>
+            </a:r>
+          </a:p>
+        </p:txBody>
+      </p:sp>
+      <p:sp>
+        <p:nvSpPr>
+          <p:cNvPr id="8" name="Limitation…"/>
+          <p:cNvSpPr txBox="1"/>
+          <p:nvPr/>
+        </p:nvSpPr>
+        <p:spPr>
+          <a:xfrm>
+            <a:off x="6168641" y="3684784"/>
+            <a:ext cx="1358943" cy="669410"/>
+          </a:xfrm>
+          <a:prstGeom prst="rect">
+            <a:avLst/>
+          </a:prstGeom>
+          <a:ln w="12700">
+            <a:miter lim="400000"/>
+          </a:ln>
+          <a:extLst>
+            <a:ext uri="{C572A759-6A51-4108-AA02-DFA0A04FC94B}">
+              <ma14:wrappingTextBoxFlag xmlns="" xmlns:ma14="http://schemas.microsoft.com/office/mac/drawingml/2011/main" val="1"/>
+            </a:ext>
+          </a:extLst>
+        </p:spPr>
+        <p:txBody>
+          <a:bodyPr wrap="square" lIns="45718" tIns="45718" rIns="45718" bIns="45718">
+            <a:spAutoFit/>
+          </a:bodyPr>
+          <a:lstStyle/>
+          <a:p>
+            <a:pPr algn="l" defTabSz="457200">
+              <a:lnSpc>
+                <a:spcPts val="4500"/>
+              </a:lnSpc>
+              <a:spcBef>
+                <a:spcPts val="1200"/>
+              </a:spcBef>
+              <a:defRPr sz="2600" b="0">
+                <a:solidFill>
+                  <a:srgbClr val="000000"/>
+                </a:solidFill>
+                <a:latin typeface="+mj-lt"/>
+                <a:ea typeface="+mj-ea"/>
+                <a:cs typeface="+mj-cs"/>
+                <a:sym typeface="Calibri Light"/>
+              </a:defRPr>
+            </a:pPr>
+            <a:r>
+              <a:rPr lang="en-US" altLang="zh-CN" dirty="0"/>
+              <a:t>dex2jar2</a:t>
+            </a:r>
+            <a:endParaRPr lang="zh-CN" altLang="en-US" dirty="0" smtClean="0"/>
+          </a:p>
+        </p:txBody>
+      </p:sp>
+      <p:sp>
+        <p:nvSpPr>
+          <p:cNvPr id="9" name="Limitation…"/>
+          <p:cNvSpPr txBox="1"/>
+          <p:nvPr/>
+        </p:nvSpPr>
+        <p:spPr>
+          <a:xfrm>
+            <a:off x="7304116" y="2718009"/>
+            <a:ext cx="1327072" cy="669410"/>
+          </a:xfrm>
+          <a:prstGeom prst="rect">
+            <a:avLst/>
+          </a:prstGeom>
+          <a:ln w="12700">
+            <a:miter lim="400000"/>
+          </a:ln>
+          <a:extLst>
+            <a:ext uri="{C572A759-6A51-4108-AA02-DFA0A04FC94B}">
+              <ma14:wrappingTextBoxFlag xmlns="" xmlns:ma14="http://schemas.microsoft.com/office/mac/drawingml/2011/main" val="1"/>
+            </a:ext>
+          </a:extLst>
+        </p:spPr>
+        <p:txBody>
+          <a:bodyPr wrap="square" lIns="45718" tIns="45718" rIns="45718" bIns="45718">
+            <a:spAutoFit/>
+          </a:bodyPr>
+          <a:lstStyle/>
+          <a:p>
+            <a:pPr algn="l" defTabSz="457200">
+              <a:lnSpc>
+                <a:spcPts val="4500"/>
+              </a:lnSpc>
+              <a:spcBef>
+                <a:spcPts val="1200"/>
+              </a:spcBef>
+              <a:defRPr sz="2600" b="0">
+                <a:solidFill>
+                  <a:srgbClr val="000000"/>
+                </a:solidFill>
+                <a:latin typeface="+mj-lt"/>
+                <a:ea typeface="+mj-ea"/>
+                <a:cs typeface="+mj-cs"/>
+                <a:sym typeface="Calibri Light"/>
+              </a:defRPr>
+            </a:pPr>
+            <a:r>
+              <a:rPr lang="en-US" altLang="zh-CN" sz="2600" b="0" dirty="0" smtClean="0">
+                <a:solidFill>
+                  <a:srgbClr val="000000"/>
+                </a:solidFill>
+                <a:sym typeface="Calibri Light"/>
+              </a:rPr>
+              <a:t>jar</a:t>
+            </a:r>
+            <a:r>
+              <a:rPr lang="zh-CN" altLang="en-US" sz="2600" b="0" dirty="0" smtClean="0">
+                <a:solidFill>
+                  <a:srgbClr val="000000"/>
+                </a:solidFill>
+                <a:sym typeface="Calibri Light"/>
+              </a:rPr>
+              <a:t>文</a:t>
+            </a:r>
+            <a:r>
+              <a:rPr lang="zh-CN" altLang="en-US" sz="2600" b="0" dirty="0">
+                <a:solidFill>
+                  <a:srgbClr val="000000"/>
+                </a:solidFill>
+                <a:sym typeface="Calibri Light"/>
+              </a:rPr>
+              <a:t>件</a:t>
+            </a:r>
+          </a:p>
+        </p:txBody>
+      </p:sp>
+      <p:sp>
+        <p:nvSpPr>
+          <p:cNvPr id="10" name="Limitation…"/>
+          <p:cNvSpPr txBox="1"/>
+          <p:nvPr/>
+        </p:nvSpPr>
+        <p:spPr>
+          <a:xfrm>
+            <a:off x="6781643" y="4818685"/>
+            <a:ext cx="1546186" cy="669410"/>
+          </a:xfrm>
+          <a:prstGeom prst="rect">
+            <a:avLst/>
+          </a:prstGeom>
+          <a:ln w="12700">
+            <a:miter lim="400000"/>
+          </a:ln>
+          <a:extLst>
+            <a:ext uri="{C572A759-6A51-4108-AA02-DFA0A04FC94B}">
+              <ma14:wrappingTextBoxFlag xmlns="" xmlns:ma14="http://schemas.microsoft.com/office/mac/drawingml/2011/main" val="1"/>
+            </a:ext>
+          </a:extLst>
+        </p:spPr>
+        <p:txBody>
+          <a:bodyPr wrap="square" lIns="45718" tIns="45718" rIns="45718" bIns="45718">
+            <a:spAutoFit/>
+          </a:bodyPr>
+          <a:lstStyle/>
+          <a:p>
+            <a:pPr algn="l" defTabSz="457200">
+              <a:lnSpc>
+                <a:spcPts val="4500"/>
+              </a:lnSpc>
+              <a:spcBef>
+                <a:spcPts val="1200"/>
+              </a:spcBef>
+              <a:defRPr sz="2600" b="0">
+                <a:solidFill>
+                  <a:srgbClr val="000000"/>
+                </a:solidFill>
+                <a:latin typeface="+mj-lt"/>
+                <a:ea typeface="+mj-ea"/>
+                <a:cs typeface="+mj-cs"/>
+                <a:sym typeface="Calibri Light"/>
+              </a:defRPr>
+            </a:pPr>
+            <a:r>
+              <a:rPr lang="en-US" altLang="zh-CN" sz="2600" b="0" dirty="0" smtClean="0">
+                <a:solidFill>
+                  <a:srgbClr val="000000"/>
+                </a:solidFill>
+                <a:sym typeface="Calibri Light"/>
+              </a:rPr>
+              <a:t>.class</a:t>
+            </a:r>
+            <a:r>
+              <a:rPr lang="zh-CN" altLang="en-US" sz="2600" b="0" dirty="0" smtClean="0">
+                <a:solidFill>
+                  <a:srgbClr val="000000"/>
+                </a:solidFill>
+                <a:sym typeface="Calibri Light"/>
+              </a:rPr>
+              <a:t>文</a:t>
+            </a:r>
+            <a:r>
+              <a:rPr lang="zh-CN" altLang="en-US" sz="2600" b="0" dirty="0">
+                <a:solidFill>
+                  <a:srgbClr val="000000"/>
+                </a:solidFill>
+                <a:sym typeface="Calibri Light"/>
+              </a:rPr>
+              <a:t>件</a:t>
+            </a:r>
+          </a:p>
+        </p:txBody>
+      </p:sp>
+      <p:sp>
+        <p:nvSpPr>
+          <p:cNvPr id="11" name="Limitation…"/>
+          <p:cNvSpPr txBox="1"/>
+          <p:nvPr/>
+        </p:nvSpPr>
+        <p:spPr>
+          <a:xfrm>
+            <a:off x="8907994" y="3768347"/>
+            <a:ext cx="727571" cy="669410"/>
+          </a:xfrm>
+          <a:prstGeom prst="rect">
+            <a:avLst/>
+          </a:prstGeom>
+          <a:ln w="12700">
+            <a:miter lim="400000"/>
+          </a:ln>
+          <a:extLst>
+            <a:ext uri="{C572A759-6A51-4108-AA02-DFA0A04FC94B}">
+              <ma14:wrappingTextBoxFlag xmlns="" xmlns:ma14="http://schemas.microsoft.com/office/mac/drawingml/2011/main" val="1"/>
+            </a:ext>
+          </a:extLst>
+        </p:spPr>
+        <p:txBody>
+          <a:bodyPr wrap="square" lIns="45718" tIns="45718" rIns="45718" bIns="45718">
+            <a:spAutoFit/>
+          </a:bodyPr>
+          <a:lstStyle/>
+          <a:p>
+            <a:pPr algn="l" defTabSz="457200">
+              <a:lnSpc>
+                <a:spcPts val="4500"/>
+              </a:lnSpc>
+              <a:spcBef>
+                <a:spcPts val="1200"/>
+              </a:spcBef>
+              <a:defRPr sz="2600" b="0">
+                <a:solidFill>
+                  <a:srgbClr val="000000"/>
+                </a:solidFill>
+                <a:latin typeface="+mj-lt"/>
+                <a:ea typeface="+mj-ea"/>
+                <a:cs typeface="+mj-cs"/>
+                <a:sym typeface="Calibri Light"/>
+              </a:defRPr>
+            </a:pPr>
+            <a:r>
+              <a:rPr lang="en-US" altLang="zh-CN" dirty="0" smtClean="0"/>
+              <a:t>7zip</a:t>
+            </a:r>
+            <a:endParaRPr lang="zh-CN" altLang="en-US" dirty="0" smtClean="0"/>
+          </a:p>
+        </p:txBody>
+      </p:sp>
+      <p:sp>
+        <p:nvSpPr>
+          <p:cNvPr id="12" name="Limitation…"/>
+          <p:cNvSpPr txBox="1"/>
+          <p:nvPr/>
+        </p:nvSpPr>
+        <p:spPr>
+          <a:xfrm>
+            <a:off x="5730249" y="5730046"/>
+            <a:ext cx="727571" cy="613113"/>
+          </a:xfrm>
+          <a:prstGeom prst="rect">
+            <a:avLst/>
+          </a:prstGeom>
+          <a:ln w="12700">
+            <a:miter lim="400000"/>
+          </a:ln>
+          <a:extLst>
+            <a:ext uri="{C572A759-6A51-4108-AA02-DFA0A04FC94B}">
+              <ma14:wrappingTextBoxFlag xmlns="" xmlns:ma14="http://schemas.microsoft.com/office/mac/drawingml/2011/main" val="1"/>
+            </a:ext>
+          </a:extLst>
+        </p:spPr>
+        <p:txBody>
+          <a:bodyPr wrap="square" lIns="45718" tIns="45718" rIns="45718" bIns="45718">
+            <a:spAutoFit/>
+          </a:bodyPr>
+          <a:lstStyle/>
+          <a:p>
+            <a:pPr algn="l" defTabSz="457200">
+              <a:lnSpc>
+                <a:spcPts val="4500"/>
+              </a:lnSpc>
+              <a:spcBef>
+                <a:spcPts val="1200"/>
+              </a:spcBef>
+              <a:defRPr sz="2600" b="0">
+                <a:solidFill>
+                  <a:srgbClr val="000000"/>
+                </a:solidFill>
+                <a:latin typeface="+mj-lt"/>
+                <a:ea typeface="+mj-ea"/>
+                <a:cs typeface="+mj-cs"/>
+                <a:sym typeface="Calibri Light"/>
+              </a:defRPr>
+            </a:pPr>
+            <a:r>
+              <a:rPr lang="en-US" altLang="zh-CN" dirty="0" smtClean="0"/>
+              <a:t>JAD</a:t>
+            </a:r>
+            <a:endParaRPr lang="zh-CN" altLang="en-US" dirty="0" smtClean="0"/>
+          </a:p>
+        </p:txBody>
+      </p:sp>
+      <p:sp>
+        <p:nvSpPr>
+          <p:cNvPr id="14" name="Limitation…"/>
+          <p:cNvSpPr txBox="1"/>
+          <p:nvPr/>
+        </p:nvSpPr>
+        <p:spPr>
+          <a:xfrm>
+            <a:off x="3881134" y="4818685"/>
+            <a:ext cx="1546186" cy="669410"/>
+          </a:xfrm>
+          <a:prstGeom prst="rect">
+            <a:avLst/>
+          </a:prstGeom>
+          <a:ln w="12700">
+            <a:miter lim="400000"/>
+          </a:ln>
+          <a:extLst>
+            <a:ext uri="{C572A759-6A51-4108-AA02-DFA0A04FC94B}">
+              <ma14:wrappingTextBoxFlag xmlns="" xmlns:ma14="http://schemas.microsoft.com/office/mac/drawingml/2011/main" val="1"/>
+            </a:ext>
+          </a:extLst>
+        </p:spPr>
+        <p:txBody>
+          <a:bodyPr wrap="square" lIns="45718" tIns="45718" rIns="45718" bIns="45718">
+            <a:spAutoFit/>
+          </a:bodyPr>
+          <a:lstStyle/>
+          <a:p>
+            <a:pPr algn="l" defTabSz="457200">
+              <a:lnSpc>
+                <a:spcPts val="4500"/>
+              </a:lnSpc>
+              <a:spcBef>
+                <a:spcPts val="1200"/>
+              </a:spcBef>
+              <a:defRPr sz="2600" b="0">
+                <a:solidFill>
+                  <a:srgbClr val="000000"/>
+                </a:solidFill>
+                <a:latin typeface="+mj-lt"/>
+                <a:ea typeface="+mj-ea"/>
+                <a:cs typeface="+mj-cs"/>
+                <a:sym typeface="Calibri Light"/>
+              </a:defRPr>
+            </a:pPr>
+            <a:r>
+              <a:rPr lang="en-US" altLang="zh-CN" sz="2600" b="0" dirty="0" smtClean="0">
+                <a:solidFill>
+                  <a:srgbClr val="000000"/>
+                </a:solidFill>
+                <a:sym typeface="Calibri Light"/>
+              </a:rPr>
+              <a:t>.java</a:t>
+            </a:r>
+            <a:r>
+              <a:rPr lang="zh-CN" altLang="en-US" sz="2600" b="0" dirty="0" smtClean="0">
+                <a:solidFill>
+                  <a:srgbClr val="000000"/>
+                </a:solidFill>
+                <a:sym typeface="Calibri Light"/>
+              </a:rPr>
+              <a:t>文</a:t>
+            </a:r>
+            <a:r>
+              <a:rPr lang="zh-CN" altLang="en-US" sz="2600" b="0" dirty="0">
+                <a:solidFill>
+                  <a:srgbClr val="000000"/>
+                </a:solidFill>
+                <a:sym typeface="Calibri Light"/>
+              </a:rPr>
+              <a:t>件</a:t>
+            </a:r>
+          </a:p>
+        </p:txBody>
+      </p:sp>
+      <p:cxnSp>
+        <p:nvCxnSpPr>
+          <p:cNvPr id="16" name="直接箭头连接符 15"/>
+          <p:cNvCxnSpPr>
+            <a:stCxn id="5" idx="3"/>
+            <a:endCxn id="7" idx="1"/>
+          </p:cNvCxnSpPr>
+          <p:nvPr/>
+        </p:nvCxnSpPr>
+        <p:spPr>
+          <a:xfrm flipV="1">
+            <a:off x="4213972" y="3049762"/>
+            <a:ext cx="881536" cy="2952"/>
+          </a:xfrm>
+          <a:prstGeom prst="straightConnector1">
+            <a:avLst/>
+          </a:prstGeom>
+          <a:noFill/>
+          <a:ln w="25400" cap="flat">
+            <a:solidFill>
+              <a:schemeClr val="accent1"/>
+            </a:solidFill>
+            <a:prstDash val="solid"/>
+            <a:round/>
+            <a:tailEnd type="triangle"/>
+          </a:ln>
+          <a:effectLst/>
+          <a:sp3d/>
+        </p:spPr>
+        <p:style>
+          <a:lnRef idx="0">
+            <a:scrgbClr r="0" g="0" b="0"/>
+          </a:lnRef>
+          <a:fillRef idx="0">
+            <a:scrgbClr r="0" g="0" b="0"/>
+          </a:fillRef>
+          <a:effectRef idx="0">
+            <a:scrgbClr r="0" g="0" b="0"/>
+          </a:effectRef>
+          <a:fontRef idx="none"/>
+        </p:style>
+      </p:cxnSp>
+      <p:cxnSp>
+        <p:nvCxnSpPr>
+          <p:cNvPr id="17" name="直接箭头连接符 16"/>
+          <p:cNvCxnSpPr/>
+          <p:nvPr/>
+        </p:nvCxnSpPr>
+        <p:spPr>
+          <a:xfrm flipV="1">
+            <a:off x="6407344" y="3100694"/>
+            <a:ext cx="881536" cy="2952"/>
+          </a:xfrm>
+          <a:prstGeom prst="straightConnector1">
+            <a:avLst/>
+          </a:prstGeom>
+          <a:noFill/>
+          <a:ln w="25400" cap="flat">
+            <a:solidFill>
+              <a:schemeClr val="accent1"/>
+            </a:solidFill>
+            <a:prstDash val="solid"/>
+            <a:round/>
+            <a:tailEnd type="triangle"/>
+          </a:ln>
+          <a:effectLst/>
+          <a:sp3d/>
+        </p:spPr>
+        <p:style>
+          <a:lnRef idx="0">
+            <a:scrgbClr r="0" g="0" b="0"/>
+          </a:lnRef>
+          <a:fillRef idx="0">
+            <a:scrgbClr r="0" g="0" b="0"/>
+          </a:fillRef>
+          <a:effectRef idx="0">
+            <a:scrgbClr r="0" g="0" b="0"/>
+          </a:effectRef>
+          <a:fontRef idx="none"/>
+        </p:style>
+      </p:cxnSp>
+      <p:cxnSp>
+        <p:nvCxnSpPr>
+          <p:cNvPr id="18" name="直接箭头连接符 17"/>
+          <p:cNvCxnSpPr>
+            <a:stCxn id="9" idx="2"/>
+            <a:endCxn id="10" idx="0"/>
+          </p:cNvCxnSpPr>
+          <p:nvPr/>
+        </p:nvCxnSpPr>
+        <p:spPr>
+          <a:xfrm flipH="1">
+            <a:off x="7554736" y="3387419"/>
+            <a:ext cx="412916" cy="1431266"/>
+          </a:xfrm>
+          <a:prstGeom prst="straightConnector1">
+            <a:avLst/>
+          </a:prstGeom>
+          <a:noFill/>
+          <a:ln w="25400" cap="flat">
+            <a:solidFill>
+              <a:schemeClr val="accent1"/>
+            </a:solidFill>
+            <a:prstDash val="solid"/>
+            <a:round/>
+            <a:tailEnd type="triangle"/>
+          </a:ln>
+          <a:effectLst/>
+          <a:sp3d/>
+        </p:spPr>
+        <p:style>
+          <a:lnRef idx="0">
+            <a:scrgbClr r="0" g="0" b="0"/>
+          </a:lnRef>
+          <a:fillRef idx="0">
+            <a:scrgbClr r="0" g="0" b="0"/>
+          </a:fillRef>
+          <a:effectRef idx="0">
+            <a:scrgbClr r="0" g="0" b="0"/>
+          </a:effectRef>
+          <a:fontRef idx="none"/>
+        </p:style>
+      </p:cxnSp>
+      <p:cxnSp>
+        <p:nvCxnSpPr>
+          <p:cNvPr id="19" name="直接箭头连接符 18"/>
+          <p:cNvCxnSpPr/>
+          <p:nvPr/>
+        </p:nvCxnSpPr>
+        <p:spPr>
+          <a:xfrm flipH="1" flipV="1">
+            <a:off x="4656715" y="3237741"/>
+            <a:ext cx="7722" cy="616985"/>
+          </a:xfrm>
+          <a:prstGeom prst="straightConnector1">
+            <a:avLst/>
+          </a:prstGeom>
+          <a:noFill/>
+          <a:ln w="25400" cap="flat">
+            <a:solidFill>
+              <a:schemeClr val="accent1"/>
+            </a:solidFill>
+            <a:prstDash val="solid"/>
+            <a:round/>
+            <a:tailEnd type="triangle"/>
+          </a:ln>
+          <a:effectLst/>
+          <a:sp3d/>
+        </p:spPr>
+        <p:style>
+          <a:lnRef idx="0">
+            <a:scrgbClr r="0" g="0" b="0"/>
+          </a:lnRef>
+          <a:fillRef idx="0">
+            <a:scrgbClr r="0" g="0" b="0"/>
+          </a:fillRef>
+          <a:effectRef idx="0">
+            <a:scrgbClr r="0" g="0" b="0"/>
+          </a:effectRef>
+          <a:fontRef idx="none"/>
+        </p:style>
+      </p:cxnSp>
+      <p:cxnSp>
+        <p:nvCxnSpPr>
+          <p:cNvPr id="21" name="直接箭头连接符 20"/>
+          <p:cNvCxnSpPr/>
+          <p:nvPr/>
+        </p:nvCxnSpPr>
+        <p:spPr>
+          <a:xfrm flipH="1" flipV="1">
+            <a:off x="6848112" y="3235151"/>
+            <a:ext cx="7722" cy="616985"/>
+          </a:xfrm>
+          <a:prstGeom prst="straightConnector1">
+            <a:avLst/>
+          </a:prstGeom>
+          <a:noFill/>
+          <a:ln w="25400" cap="flat">
+            <a:solidFill>
+              <a:schemeClr val="accent1"/>
+            </a:solidFill>
+            <a:prstDash val="solid"/>
+            <a:round/>
+            <a:tailEnd type="triangle"/>
+          </a:ln>
+          <a:effectLst/>
+          <a:sp3d/>
+        </p:spPr>
+        <p:style>
+          <a:lnRef idx="0">
+            <a:scrgbClr r="0" g="0" b="0"/>
+          </a:lnRef>
+          <a:fillRef idx="0">
+            <a:scrgbClr r="0" g="0" b="0"/>
+          </a:fillRef>
+          <a:effectRef idx="0">
+            <a:scrgbClr r="0" g="0" b="0"/>
+          </a:effectRef>
+          <a:fontRef idx="none"/>
+        </p:style>
+      </p:cxnSp>
+      <p:cxnSp>
+        <p:nvCxnSpPr>
+          <p:cNvPr id="22" name="直接箭头连接符 21"/>
+          <p:cNvCxnSpPr>
+            <a:stCxn id="11" idx="1"/>
+          </p:cNvCxnSpPr>
+          <p:nvPr/>
+        </p:nvCxnSpPr>
+        <p:spPr>
+          <a:xfrm flipH="1">
+            <a:off x="7831450" y="4103052"/>
+            <a:ext cx="1076544" cy="12938"/>
+          </a:xfrm>
+          <a:prstGeom prst="straightConnector1">
+            <a:avLst/>
+          </a:prstGeom>
+          <a:noFill/>
+          <a:ln w="25400" cap="flat">
+            <a:solidFill>
+              <a:schemeClr val="accent1"/>
+            </a:solidFill>
+            <a:prstDash val="solid"/>
+            <a:round/>
+            <a:tailEnd type="triangle"/>
+          </a:ln>
+          <a:effectLst/>
+          <a:sp3d/>
+        </p:spPr>
+        <p:style>
+          <a:lnRef idx="0">
+            <a:scrgbClr r="0" g="0" b="0"/>
+          </a:lnRef>
+          <a:fillRef idx="0">
+            <a:scrgbClr r="0" g="0" b="0"/>
+          </a:fillRef>
+          <a:effectRef idx="0">
+            <a:scrgbClr r="0" g="0" b="0"/>
+          </a:effectRef>
+          <a:fontRef idx="none"/>
+        </p:style>
+      </p:cxnSp>
+      <p:cxnSp>
+        <p:nvCxnSpPr>
+          <p:cNvPr id="33" name="直接箭头连接符 32"/>
+          <p:cNvCxnSpPr/>
+          <p:nvPr/>
+        </p:nvCxnSpPr>
+        <p:spPr>
+          <a:xfrm flipH="1">
+            <a:off x="5440896" y="5225329"/>
+            <a:ext cx="1142784" cy="0"/>
+          </a:xfrm>
+          <a:prstGeom prst="straightConnector1">
+            <a:avLst/>
+          </a:prstGeom>
+          <a:noFill/>
+          <a:ln w="25400" cap="flat">
+            <a:solidFill>
+              <a:schemeClr val="accent1"/>
+            </a:solidFill>
+            <a:prstDash val="solid"/>
+            <a:round/>
+            <a:tailEnd type="triangle"/>
+          </a:ln>
+          <a:effectLst/>
+          <a:sp3d/>
+        </p:spPr>
+        <p:style>
+          <a:lnRef idx="0">
+            <a:scrgbClr r="0" g="0" b="0"/>
+          </a:lnRef>
+          <a:fillRef idx="0">
+            <a:scrgbClr r="0" g="0" b="0"/>
+          </a:fillRef>
+          <a:effectRef idx="0">
+            <a:scrgbClr r="0" g="0" b="0"/>
+          </a:effectRef>
+          <a:fontRef idx="none"/>
+        </p:style>
+      </p:cxnSp>
+      <p:cxnSp>
+        <p:nvCxnSpPr>
+          <p:cNvPr id="34" name="直接箭头连接符 33"/>
+          <p:cNvCxnSpPr/>
+          <p:nvPr/>
+        </p:nvCxnSpPr>
+        <p:spPr>
+          <a:xfrm flipH="1" flipV="1">
+            <a:off x="5992868" y="5265576"/>
+            <a:ext cx="7722" cy="616985"/>
+          </a:xfrm>
+          <a:prstGeom prst="straightConnector1">
+            <a:avLst/>
+          </a:prstGeom>
+          <a:noFill/>
+          <a:ln w="25400" cap="flat">
+            <a:solidFill>
+              <a:schemeClr val="accent1"/>
+            </a:solidFill>
+            <a:prstDash val="solid"/>
+            <a:round/>
+            <a:tailEnd type="triangle"/>
+          </a:ln>
+          <a:effectLst/>
+          <a:sp3d/>
+        </p:spPr>
+        <p:style>
+          <a:lnRef idx="0">
+            <a:scrgbClr r="0" g="0" b="0"/>
+          </a:lnRef>
+          <a:fillRef idx="0">
+            <a:scrgbClr r="0" g="0" b="0"/>
+          </a:fillRef>
+          <a:effectRef idx="0">
+            <a:scrgbClr r="0" g="0" b="0"/>
+          </a:effectRef>
+          <a:fontRef idx="none"/>
+        </p:style>
+      </p:cxnSp>
+    </p:spTree>
+    <p:extLst>
+      <p:ext uri="{BB962C8B-B14F-4D97-AF65-F5344CB8AC3E}">
+        <p14:creationId xmlns:p14="http://schemas.microsoft.com/office/powerpoint/2010/main" val="1423625278"/>
+      </p:ext>
+    </p:extLst>
+  </p:cSld>
+  <p:clrMapOvr>
+    <a:masterClrMapping/>
+  </p:clrMapOvr>
+  <p:transition spd="med"/>
+  <p:timing>
+    <p:tnLst>
+      <p:par>
+        <p:cTn id="1" dur="indefinite" restart="never" nodeType="tmRoot">
+          <p:childTnLst>
+            <p:seq concurrent="1" nextAc="seek">
+              <p:cTn id="2" dur="indefinite" nodeType="mainSeq">
+                <p:childTnLst>
+                  <p:par>
+                    <p:cTn id="3" fill="hold">
+                      <p:stCondLst>
+                        <p:cond delay="indefinite"/>
+                      </p:stCondLst>
+                      <p:childTnLst>
+                        <p:par>
+                          <p:cTn id="4" fill="hold">
+                            <p:stCondLst>
+                              <p:cond delay="0"/>
+                            </p:stCondLst>
+                            <p:childTnLst>
+                              <p:par>
+                                <p:cTn id="5" presetID="1" presetClass="entr" presetSubtype="0" fill="hold" grpId="0" nodeType="clickEffect">
+                                  <p:stCondLst>
+                                    <p:cond delay="0"/>
+                                  </p:stCondLst>
+                                  <p:childTnLst>
+                                    <p:set>
+                                      <p:cBhvr>
+                                        <p:cTn id="6" dur="1" fill="hold">
+                                          <p:stCondLst>
+                                            <p:cond delay="0"/>
+                                          </p:stCondLst>
+                                        </p:cTn>
+                                        <p:tgtEl>
+                                          <p:spTgt spid="5"/>
+                                        </p:tgtEl>
+                                        <p:attrNameLst>
+                                          <p:attrName>style.visibility</p:attrName>
+                                        </p:attrNameLst>
+                                      </p:cBhvr>
+                                      <p:to>
+                                        <p:strVal val="visible"/>
+                                      </p:to>
+                                    </p:set>
+                                  </p:childTnLst>
+                                </p:cTn>
+                              </p:par>
+                            </p:childTnLst>
+                          </p:cTn>
+                        </p:par>
+                      </p:childTnLst>
+                    </p:cTn>
+                  </p:par>
+                  <p:par>
+                    <p:cTn id="7" fill="hold">
+                      <p:stCondLst>
+                        <p:cond delay="indefinite"/>
+                      </p:stCondLst>
+                      <p:childTnLst>
+                        <p:par>
+                          <p:cTn id="8" fill="hold">
+                            <p:stCondLst>
+                              <p:cond delay="0"/>
+                            </p:stCondLst>
+                            <p:childTnLst>
+                              <p:par>
+                                <p:cTn id="9" presetID="1" presetClass="entr" presetSubtype="0" fill="hold" nodeType="clickEffect">
+                                  <p:stCondLst>
+                                    <p:cond delay="0"/>
+                                  </p:stCondLst>
+                                  <p:childTnLst>
+                                    <p:set>
+                                      <p:cBhvr>
+                                        <p:cTn id="10" dur="1" fill="hold">
+                                          <p:stCondLst>
+                                            <p:cond delay="0"/>
+                                          </p:stCondLst>
+                                        </p:cTn>
+                                        <p:tgtEl>
+                                          <p:spTgt spid="16"/>
+                                        </p:tgtEl>
+                                        <p:attrNameLst>
+                                          <p:attrName>style.visibility</p:attrName>
+                                        </p:attrNameLst>
+                                      </p:cBhvr>
+                                      <p:to>
+                                        <p:strVal val="visible"/>
+                                      </p:to>
+                                    </p:set>
+                                  </p:childTnLst>
+                                </p:cTn>
+                              </p:par>
+                              <p:par>
+                                <p:cTn id="11" presetID="1" presetClass="entr" presetSubtype="0" fill="hold" grpId="0" nodeType="withEffect">
+                                  <p:stCondLst>
+                                    <p:cond delay="0"/>
+                                  </p:stCondLst>
+                                  <p:childTnLst>
+                                    <p:set>
+                                      <p:cBhvr>
+                                        <p:cTn id="12" dur="1" fill="hold">
+                                          <p:stCondLst>
+                                            <p:cond delay="0"/>
+                                          </p:stCondLst>
+                                        </p:cTn>
+                                        <p:tgtEl>
+                                          <p:spTgt spid="7"/>
+                                        </p:tgtEl>
+                                        <p:attrNameLst>
+                                          <p:attrName>style.visibility</p:attrName>
+                                        </p:attrNameLst>
+                                      </p:cBhvr>
+                                      <p:to>
+                                        <p:strVal val="visible"/>
+                                      </p:to>
+                                    </p:set>
+                                  </p:childTnLst>
+                                </p:cTn>
+                              </p:par>
+                              <p:par>
+                                <p:cTn id="13" presetID="1" presetClass="entr" presetSubtype="0" fill="hold" nodeType="withEffect">
+                                  <p:stCondLst>
+                                    <p:cond delay="0"/>
+                                  </p:stCondLst>
+                                  <p:childTnLst>
+                                    <p:set>
+                                      <p:cBhvr>
+                                        <p:cTn id="14" dur="1" fill="hold">
+                                          <p:stCondLst>
+                                            <p:cond delay="0"/>
+                                          </p:stCondLst>
+                                        </p:cTn>
+                                        <p:tgtEl>
+                                          <p:spTgt spid="19"/>
+                                        </p:tgtEl>
+                                        <p:attrNameLst>
+                                          <p:attrName>style.visibility</p:attrName>
+                                        </p:attrNameLst>
+                                      </p:cBhvr>
+                                      <p:to>
+                                        <p:strVal val="visible"/>
+                                      </p:to>
+                                    </p:set>
+                                  </p:childTnLst>
+                                </p:cTn>
+                              </p:par>
+                              <p:par>
+                                <p:cTn id="15" presetID="1" presetClass="entr" presetSubtype="0" fill="hold" grpId="0" nodeType="withEffect">
+                                  <p:stCondLst>
+                                    <p:cond delay="0"/>
+                                  </p:stCondLst>
+                                  <p:childTnLst>
+                                    <p:set>
+                                      <p:cBhvr>
+                                        <p:cTn id="16" dur="1" fill="hold">
+                                          <p:stCondLst>
+                                            <p:cond delay="0"/>
+                                          </p:stCondLst>
+                                        </p:cTn>
+                                        <p:tgtEl>
+                                          <p:spTgt spid="6"/>
+                                        </p:tgtEl>
+                                        <p:attrNameLst>
+                                          <p:attrName>style.visibility</p:attrName>
+                                        </p:attrNameLst>
+                                      </p:cBhvr>
+                                      <p:to>
+                                        <p:strVal val="visible"/>
+                                      </p:to>
+                                    </p:set>
+                                  </p:childTnLst>
+                                </p:cTn>
+                              </p:par>
+                            </p:childTnLst>
+                          </p:cTn>
+                        </p:par>
+                      </p:childTnLst>
+                    </p:cTn>
+                  </p:par>
+                  <p:par>
+                    <p:cTn id="17" fill="hold">
+                      <p:stCondLst>
+                        <p:cond delay="indefinite"/>
+                      </p:stCondLst>
+                      <p:childTnLst>
+                        <p:par>
+                          <p:cTn id="18" fill="hold">
+                            <p:stCondLst>
+                              <p:cond delay="0"/>
+                            </p:stCondLst>
+                            <p:childTnLst>
+                              <p:par>
+                                <p:cTn id="19" presetID="1" presetClass="entr" presetSubtype="0" fill="hold" nodeType="clickEffect">
+                                  <p:stCondLst>
+                                    <p:cond delay="0"/>
+                                  </p:stCondLst>
+                                  <p:childTnLst>
+                                    <p:set>
+                                      <p:cBhvr>
+                                        <p:cTn id="20" dur="1" fill="hold">
+                                          <p:stCondLst>
+                                            <p:cond delay="0"/>
+                                          </p:stCondLst>
+                                        </p:cTn>
+                                        <p:tgtEl>
+                                          <p:spTgt spid="17"/>
+                                        </p:tgtEl>
+                                        <p:attrNameLst>
+                                          <p:attrName>style.visibility</p:attrName>
+                                        </p:attrNameLst>
+                                      </p:cBhvr>
+                                      <p:to>
+                                        <p:strVal val="visible"/>
+                                      </p:to>
+                                    </p:set>
+                                  </p:childTnLst>
+                                </p:cTn>
+                              </p:par>
+                              <p:par>
+                                <p:cTn id="21" presetID="1" presetClass="entr" presetSubtype="0" fill="hold" nodeType="withEffect">
+                                  <p:stCondLst>
+                                    <p:cond delay="0"/>
+                                  </p:stCondLst>
+                                  <p:childTnLst>
+                                    <p:set>
+                                      <p:cBhvr>
+                                        <p:cTn id="22" dur="1" fill="hold">
+                                          <p:stCondLst>
+                                            <p:cond delay="0"/>
+                                          </p:stCondLst>
+                                        </p:cTn>
+                                        <p:tgtEl>
+                                          <p:spTgt spid="21"/>
+                                        </p:tgtEl>
+                                        <p:attrNameLst>
+                                          <p:attrName>style.visibility</p:attrName>
+                                        </p:attrNameLst>
+                                      </p:cBhvr>
+                                      <p:to>
+                                        <p:strVal val="visible"/>
+                                      </p:to>
+                                    </p:set>
+                                  </p:childTnLst>
+                                </p:cTn>
+                              </p:par>
+                              <p:par>
+                                <p:cTn id="23" presetID="1" presetClass="entr" presetSubtype="0" fill="hold" grpId="0" nodeType="withEffect">
+                                  <p:stCondLst>
+                                    <p:cond delay="0"/>
+                                  </p:stCondLst>
+                                  <p:childTnLst>
+                                    <p:set>
+                                      <p:cBhvr>
+                                        <p:cTn id="24" dur="1" fill="hold">
+                                          <p:stCondLst>
+                                            <p:cond delay="0"/>
+                                          </p:stCondLst>
+                                        </p:cTn>
+                                        <p:tgtEl>
+                                          <p:spTgt spid="8"/>
+                                        </p:tgtEl>
+                                        <p:attrNameLst>
+                                          <p:attrName>style.visibility</p:attrName>
+                                        </p:attrNameLst>
+                                      </p:cBhvr>
+                                      <p:to>
+                                        <p:strVal val="visible"/>
+                                      </p:to>
+                                    </p:set>
+                                  </p:childTnLst>
+                                </p:cTn>
+                              </p:par>
+                              <p:par>
+                                <p:cTn id="25" presetID="1" presetClass="entr" presetSubtype="0" fill="hold" grpId="0" nodeType="withEffect">
+                                  <p:stCondLst>
+                                    <p:cond delay="0"/>
+                                  </p:stCondLst>
+                                  <p:childTnLst>
+                                    <p:set>
+                                      <p:cBhvr>
+                                        <p:cTn id="26" dur="1" fill="hold">
+                                          <p:stCondLst>
+                                            <p:cond delay="0"/>
+                                          </p:stCondLst>
+                                        </p:cTn>
+                                        <p:tgtEl>
+                                          <p:spTgt spid="9"/>
+                                        </p:tgtEl>
+                                        <p:attrNameLst>
+                                          <p:attrName>style.visibility</p:attrName>
+                                        </p:attrNameLst>
+                                      </p:cBhvr>
+                                      <p:to>
+                                        <p:strVal val="visible"/>
+                                      </p:to>
+                                    </p:set>
+                                  </p:childTnLst>
+                                </p:cTn>
+                              </p:par>
+                            </p:childTnLst>
+                          </p:cTn>
+                        </p:par>
+                      </p:childTnLst>
+                    </p:cTn>
+                  </p:par>
+                  <p:par>
+                    <p:cTn id="27" fill="hold">
+                      <p:stCondLst>
+                        <p:cond delay="indefinite"/>
+                      </p:stCondLst>
+                      <p:childTnLst>
+                        <p:par>
+                          <p:cTn id="28" fill="hold">
+                            <p:stCondLst>
+                              <p:cond delay="0"/>
+                            </p:stCondLst>
+                            <p:childTnLst>
+                              <p:par>
+                                <p:cTn id="29" presetID="1" presetClass="entr" presetSubtype="0" fill="hold" nodeType="clickEffect">
+                                  <p:stCondLst>
+                                    <p:cond delay="0"/>
+                                  </p:stCondLst>
+                                  <p:childTnLst>
+                                    <p:set>
+                                      <p:cBhvr>
+                                        <p:cTn id="30" dur="1" fill="hold">
+                                          <p:stCondLst>
+                                            <p:cond delay="0"/>
+                                          </p:stCondLst>
+                                        </p:cTn>
+                                        <p:tgtEl>
+                                          <p:spTgt spid="18"/>
+                                        </p:tgtEl>
+                                        <p:attrNameLst>
+                                          <p:attrName>style.visibility</p:attrName>
+                                        </p:attrNameLst>
+                                      </p:cBhvr>
+                                      <p:to>
+                                        <p:strVal val="visible"/>
+                                      </p:to>
+                                    </p:set>
+                                  </p:childTnLst>
+                                </p:cTn>
+                              </p:par>
+                              <p:par>
+                                <p:cTn id="31" presetID="1" presetClass="entr" presetSubtype="0" fill="hold" nodeType="withEffect">
+                                  <p:stCondLst>
+                                    <p:cond delay="0"/>
+                                  </p:stCondLst>
+                                  <p:childTnLst>
+                                    <p:set>
+                                      <p:cBhvr>
+                                        <p:cTn id="32" dur="1" fill="hold">
+                                          <p:stCondLst>
+                                            <p:cond delay="0"/>
+                                          </p:stCondLst>
+                                        </p:cTn>
+                                        <p:tgtEl>
+                                          <p:spTgt spid="22"/>
+                                        </p:tgtEl>
+                                        <p:attrNameLst>
+                                          <p:attrName>style.visibility</p:attrName>
+                                        </p:attrNameLst>
+                                      </p:cBhvr>
+                                      <p:to>
+                                        <p:strVal val="visible"/>
+                                      </p:to>
+                                    </p:set>
+                                  </p:childTnLst>
+                                </p:cTn>
+                              </p:par>
+                              <p:par>
+                                <p:cTn id="33" presetID="1" presetClass="entr" presetSubtype="0" fill="hold" grpId="0" nodeType="withEffect">
+                                  <p:stCondLst>
+                                    <p:cond delay="0"/>
+                                  </p:stCondLst>
+                                  <p:childTnLst>
+                                    <p:set>
+                                      <p:cBhvr>
+                                        <p:cTn id="34" dur="1" fill="hold">
+                                          <p:stCondLst>
+                                            <p:cond delay="0"/>
+                                          </p:stCondLst>
+                                        </p:cTn>
+                                        <p:tgtEl>
+                                          <p:spTgt spid="11"/>
+                                        </p:tgtEl>
+                                        <p:attrNameLst>
+                                          <p:attrName>style.visibility</p:attrName>
+                                        </p:attrNameLst>
+                                      </p:cBhvr>
+                                      <p:to>
+                                        <p:strVal val="visible"/>
+                                      </p:to>
+                                    </p:set>
+                                  </p:childTnLst>
+                                </p:cTn>
+                              </p:par>
+                              <p:par>
+                                <p:cTn id="35" presetID="1" presetClass="entr" presetSubtype="0" fill="hold" grpId="0" nodeType="withEffect">
+                                  <p:stCondLst>
+                                    <p:cond delay="0"/>
+                                  </p:stCondLst>
+                                  <p:childTnLst>
+                                    <p:set>
+                                      <p:cBhvr>
+                                        <p:cTn id="36" dur="1" fill="hold">
+                                          <p:stCondLst>
+                                            <p:cond delay="0"/>
+                                          </p:stCondLst>
+                                        </p:cTn>
+                                        <p:tgtEl>
+                                          <p:spTgt spid="10"/>
+                                        </p:tgtEl>
+                                        <p:attrNameLst>
+                                          <p:attrName>style.visibility</p:attrName>
+                                        </p:attrNameLst>
+                                      </p:cBhvr>
+                                      <p:to>
+                                        <p:strVal val="visible"/>
+                                      </p:to>
+                                    </p:set>
+                                  </p:childTnLst>
+                                </p:cTn>
+                              </p:par>
+                            </p:childTnLst>
+                          </p:cTn>
+                        </p:par>
+                      </p:childTnLst>
+                    </p:cTn>
+                  </p:par>
+                  <p:par>
+                    <p:cTn id="37" fill="hold">
+                      <p:stCondLst>
+                        <p:cond delay="indefinite"/>
+                      </p:stCondLst>
+                      <p:childTnLst>
+                        <p:par>
+                          <p:cTn id="38" fill="hold">
+                            <p:stCondLst>
+                              <p:cond delay="0"/>
+                            </p:stCondLst>
+                            <p:childTnLst>
+                              <p:par>
+                                <p:cTn id="39" presetID="1" presetClass="entr" presetSubtype="0" fill="hold" nodeType="clickEffect">
+                                  <p:stCondLst>
+                                    <p:cond delay="0"/>
+                                  </p:stCondLst>
+                                  <p:childTnLst>
+                                    <p:set>
+                                      <p:cBhvr>
+                                        <p:cTn id="40" dur="1" fill="hold">
+                                          <p:stCondLst>
+                                            <p:cond delay="0"/>
+                                          </p:stCondLst>
+                                        </p:cTn>
+                                        <p:tgtEl>
+                                          <p:spTgt spid="33"/>
+                                        </p:tgtEl>
+                                        <p:attrNameLst>
+                                          <p:attrName>style.visibility</p:attrName>
+                                        </p:attrNameLst>
+                                      </p:cBhvr>
+                                      <p:to>
+                                        <p:strVal val="visible"/>
+                                      </p:to>
+                                    </p:set>
+                                  </p:childTnLst>
+                                </p:cTn>
+                              </p:par>
+                              <p:par>
+                                <p:cTn id="41" presetID="1" presetClass="entr" presetSubtype="0" fill="hold" nodeType="withEffect">
+                                  <p:stCondLst>
+                                    <p:cond delay="0"/>
+                                  </p:stCondLst>
+                                  <p:childTnLst>
+                                    <p:set>
+                                      <p:cBhvr>
+                                        <p:cTn id="42" dur="1" fill="hold">
+                                          <p:stCondLst>
+                                            <p:cond delay="0"/>
+                                          </p:stCondLst>
+                                        </p:cTn>
+                                        <p:tgtEl>
+                                          <p:spTgt spid="34"/>
+                                        </p:tgtEl>
+                                        <p:attrNameLst>
+                                          <p:attrName>style.visibility</p:attrName>
+                                        </p:attrNameLst>
+                                      </p:cBhvr>
+                                      <p:to>
+                                        <p:strVal val="visible"/>
+                                      </p:to>
+                                    </p:set>
+                                  </p:childTnLst>
+                                </p:cTn>
+                              </p:par>
+                              <p:par>
+                                <p:cTn id="43" presetID="1" presetClass="entr" presetSubtype="0" fill="hold" grpId="0" nodeType="withEffect">
+                                  <p:stCondLst>
+                                    <p:cond delay="0"/>
+                                  </p:stCondLst>
+                                  <p:childTnLst>
+                                    <p:set>
+                                      <p:cBhvr>
+                                        <p:cTn id="44" dur="1" fill="hold">
+                                          <p:stCondLst>
+                                            <p:cond delay="0"/>
+                                          </p:stCondLst>
+                                        </p:cTn>
+                                        <p:tgtEl>
+                                          <p:spTgt spid="14"/>
+                                        </p:tgtEl>
+                                        <p:attrNameLst>
+                                          <p:attrName>style.visibility</p:attrName>
+                                        </p:attrNameLst>
+                                      </p:cBhvr>
+                                      <p:to>
+                                        <p:strVal val="visible"/>
+                                      </p:to>
+                                    </p:set>
+                                  </p:childTnLst>
+                                </p:cTn>
+                              </p:par>
+                              <p:par>
+                                <p:cTn id="45" presetID="1" presetClass="entr" presetSubtype="0" fill="hold" grpId="0" nodeType="withEffect">
+                                  <p:stCondLst>
+                                    <p:cond delay="0"/>
+                                  </p:stCondLst>
+                                  <p:childTnLst>
+                                    <p:set>
+                                      <p:cBhvr>
+                                        <p:cTn id="46" dur="1" fill="hold">
+                                          <p:stCondLst>
+                                            <p:cond delay="0"/>
+                                          </p:stCondLst>
+                                        </p:cTn>
+                                        <p:tgtEl>
+                                          <p:spTgt spid="12"/>
+                                        </p:tgtEl>
+                                        <p:attrNameLst>
+                                          <p:attrName>style.visibility</p:attrName>
+                                        </p:attrNameLst>
+                                      </p:cBhvr>
+                                      <p:to>
+                                        <p:strVal val="visible"/>
+                                      </p:to>
+                                    </p:set>
+                                  </p:childTnLst>
+                                </p:cTn>
+                              </p:par>
+                            </p:childTnLst>
+                          </p:cTn>
+                        </p:par>
+                      </p:childTnLst>
+                    </p:cTn>
+                  </p:par>
+                </p:childTnLst>
+              </p:cTn>
+              <p:prevCondLst>
+                <p:cond evt="onPrev" delay="0">
+                  <p:tgtEl>
+                    <p:sldTgt/>
+                  </p:tgtEl>
+                </p:cond>
+              </p:prevCondLst>
+              <p:nextCondLst>
+                <p:cond evt="onNext" delay="0">
+                  <p:tgtEl>
+                    <p:sldTgt/>
+                  </p:tgtEl>
+                </p:cond>
+              </p:nextCondLst>
+            </p:seq>
+          </p:childTnLst>
+        </p:cTn>
+      </p:par>
+    </p:tnLst>
+    <p:bldLst>
+      <p:bldP spid="5" grpId="0" animBg="1"/>
+      <p:bldP spid="6" grpId="0" animBg="1"/>
+      <p:bldP spid="7" grpId="0" animBg="1"/>
+      <p:bldP spid="8" grpId="0" animBg="1"/>
+      <p:bldP spid="9" grpId="0" animBg="1"/>
+      <p:bldP spid="10" grpId="0" animBg="1"/>
+      <p:bldP spid="11" grpId="0" animBg="1"/>
+      <p:bldP spid="12" grpId="0" animBg="1"/>
+      <p:bldP spid="14" grpId="0" animBg="1"/>
+    </p:bldLst>
+  </p:timing>
+</p:sld>
+</file>
+
+<file path=ppt/slides/slide36.xml><?xml version="1.0" encoding="utf-8"?>
+<p:sld xmlns:a="http://schemas.openxmlformats.org/drawingml/2006/main" xmlns:r="http://schemas.openxmlformats.org/officeDocument/2006/relationships" xmlns:p="http://schemas.openxmlformats.org/presentationml/2006/main">
+  <p:cSld>
+    <p:spTree>
+      <p:nvGrpSpPr>
+        <p:cNvPr id="1" name=""/>
+        <p:cNvGrpSpPr/>
+        <p:nvPr/>
+      </p:nvGrpSpPr>
+      <p:grpSpPr>
+        <a:xfrm>
+          <a:off x="0" y="0"/>
+          <a:ext cx="0" cy="0"/>
+          <a:chOff x="0" y="0"/>
+          <a:chExt cx="0" cy="0"/>
+        </a:xfrm>
+      </p:grpSpPr>
+      <p:sp>
+        <p:nvSpPr>
+          <p:cNvPr id="2" name="标题 1"/>
+          <p:cNvSpPr>
+            <a:spLocks noGrp="1"/>
+          </p:cNvSpPr>
+          <p:nvPr>
+            <p:ph type="title"/>
+          </p:nvPr>
+        </p:nvSpPr>
+        <p:spPr/>
+        <p:txBody>
+          <a:bodyPr/>
+          <a:lstStyle/>
+          <a:p>
+            <a:r>
+              <a:rPr lang="zh-CN" altLang="en-US" dirty="0" smtClean="0">
+                <a:latin typeface="黑体" panose="02010609060101010101" pitchFamily="49" charset="-122"/>
+                <a:ea typeface="黑体" panose="02010609060101010101" pitchFamily="49" charset="-122"/>
+              </a:rPr>
+              <a:t>实验</a:t>
+            </a:r>
+            <a:endParaRPr lang="zh-CN" altLang="en-US" dirty="0">
+              <a:latin typeface="黑体" panose="02010609060101010101" pitchFamily="49" charset="-122"/>
+              <a:ea typeface="黑体" panose="02010609060101010101" pitchFamily="49" charset="-122"/>
+            </a:endParaRPr>
+          </a:p>
+        </p:txBody>
+      </p:sp>
+      <p:sp>
+        <p:nvSpPr>
+          <p:cNvPr id="3" name="Limitation…"/>
+          <p:cNvSpPr txBox="1"/>
+          <p:nvPr/>
+        </p:nvSpPr>
+        <p:spPr>
+          <a:xfrm>
+            <a:off x="1627113" y="1691239"/>
+            <a:ext cx="9020110" cy="3593287"/>
+          </a:xfrm>
+          <a:prstGeom prst="rect">
+            <a:avLst/>
+          </a:prstGeom>
+          <a:ln w="12700">
+            <a:miter lim="400000"/>
+          </a:ln>
+          <a:extLst>
+            <a:ext uri="{C572A759-6A51-4108-AA02-DFA0A04FC94B}">
+              <ma14:wrappingTextBoxFlag xmlns="" xmlns:ma14="http://schemas.microsoft.com/office/mac/drawingml/2011/main" val="1"/>
+            </a:ext>
+          </a:extLst>
+        </p:spPr>
+        <p:txBody>
+          <a:bodyPr lIns="45718" tIns="45718" rIns="45718" bIns="45718">
+            <a:spAutoFit/>
+          </a:bodyPr>
+          <a:lstStyle/>
+          <a:p>
+            <a:pPr marL="514350" indent="-514350" algn="l" defTabSz="457200">
+              <a:lnSpc>
+                <a:spcPts val="4500"/>
+              </a:lnSpc>
+              <a:spcBef>
+                <a:spcPts val="1200"/>
+              </a:spcBef>
+              <a:buAutoNum type="arabicPeriod"/>
+              <a:defRPr sz="2600" b="0">
+                <a:solidFill>
+                  <a:srgbClr val="000000"/>
+                </a:solidFill>
+                <a:latin typeface="+mj-lt"/>
+                <a:ea typeface="+mj-ea"/>
+                <a:cs typeface="+mj-cs"/>
+                <a:sym typeface="Calibri Light"/>
+              </a:defRPr>
+            </a:pPr>
+            <a:r>
+              <a:rPr lang="en-US" altLang="zh-CN" dirty="0" smtClean="0"/>
+              <a:t>Android APK</a:t>
+            </a:r>
+            <a:r>
+              <a:rPr lang="zh-CN" altLang="en-US" dirty="0" smtClean="0"/>
+              <a:t>文件的反编译</a:t>
+            </a:r>
+            <a:endParaRPr lang="en-US" altLang="zh-CN" dirty="0" smtClean="0"/>
+          </a:p>
+          <a:p>
+            <a:pPr algn="l" defTabSz="457200">
+              <a:lnSpc>
+                <a:spcPts val="4500"/>
+              </a:lnSpc>
+              <a:spcBef>
+                <a:spcPts val="1200"/>
+              </a:spcBef>
+              <a:defRPr sz="2600" b="0">
+                <a:solidFill>
+                  <a:srgbClr val="000000"/>
+                </a:solidFill>
+                <a:latin typeface="+mj-lt"/>
+                <a:ea typeface="+mj-ea"/>
+                <a:cs typeface="+mj-cs"/>
+                <a:sym typeface="Calibri Light"/>
+              </a:defRPr>
+            </a:pPr>
+            <a:r>
+              <a:rPr lang="en-US" altLang="zh-CN" dirty="0" smtClean="0"/>
+              <a:t>	</a:t>
+            </a:r>
+            <a:r>
+              <a:rPr lang="en-US" altLang="zh-CN" dirty="0" err="1" smtClean="0"/>
+              <a:t>apktool</a:t>
+            </a:r>
+            <a:r>
+              <a:rPr lang="en-US" altLang="zh-CN" dirty="0" smtClean="0"/>
+              <a:t> </a:t>
+            </a:r>
+            <a:r>
+              <a:rPr lang="en-US" altLang="zh-CN" dirty="0"/>
+              <a:t>d </a:t>
+            </a:r>
+            <a:r>
+              <a:rPr lang="en-US" altLang="zh-CN" dirty="0" err="1"/>
+              <a:t>test.apk</a:t>
+            </a:r>
+            <a:endParaRPr lang="en-US" altLang="zh-CN" dirty="0"/>
+          </a:p>
+          <a:p>
+            <a:pPr algn="l" defTabSz="457200">
+              <a:lnSpc>
+                <a:spcPts val="4500"/>
+              </a:lnSpc>
+              <a:spcBef>
+                <a:spcPts val="1200"/>
+              </a:spcBef>
+              <a:defRPr sz="2600" b="0">
+                <a:solidFill>
+                  <a:srgbClr val="000000"/>
+                </a:solidFill>
+                <a:latin typeface="+mj-lt"/>
+                <a:ea typeface="+mj-ea"/>
+                <a:cs typeface="+mj-cs"/>
+                <a:sym typeface="Calibri Light"/>
+              </a:defRPr>
+            </a:pPr>
+            <a:r>
+              <a:rPr lang="en-US" altLang="zh-CN" dirty="0" smtClean="0"/>
+              <a:t>	d2j-dex2jar.bat </a:t>
+            </a:r>
+            <a:r>
+              <a:rPr lang="en-US" altLang="zh-CN" dirty="0" err="1"/>
+              <a:t>classes.dex</a:t>
+            </a:r>
+            <a:endParaRPr lang="en-US" altLang="zh-CN" dirty="0"/>
+          </a:p>
+          <a:p>
+            <a:pPr algn="l" defTabSz="457200">
+              <a:lnSpc>
+                <a:spcPts val="4500"/>
+              </a:lnSpc>
+              <a:spcBef>
+                <a:spcPts val="1200"/>
+              </a:spcBef>
+              <a:defRPr sz="2600" b="0">
+                <a:solidFill>
+                  <a:srgbClr val="000000"/>
+                </a:solidFill>
+                <a:latin typeface="+mj-lt"/>
+                <a:ea typeface="+mj-ea"/>
+                <a:cs typeface="+mj-cs"/>
+                <a:sym typeface="Calibri Light"/>
+              </a:defRPr>
+            </a:pPr>
+            <a:r>
+              <a:rPr lang="en-US" altLang="zh-CN" dirty="0" smtClean="0"/>
+              <a:t>	7zip</a:t>
+            </a:r>
+            <a:r>
+              <a:rPr lang="zh-CN" altLang="en-US" dirty="0" smtClean="0"/>
+              <a:t>解压</a:t>
+            </a:r>
+            <a:endParaRPr lang="en-US" altLang="zh-CN" dirty="0" smtClean="0"/>
+          </a:p>
+          <a:p>
+            <a:pPr algn="l" defTabSz="457200">
+              <a:lnSpc>
+                <a:spcPts val="4500"/>
+              </a:lnSpc>
+              <a:spcBef>
+                <a:spcPts val="1200"/>
+              </a:spcBef>
+              <a:defRPr sz="2600" b="0">
+                <a:solidFill>
+                  <a:srgbClr val="000000"/>
+                </a:solidFill>
+                <a:latin typeface="+mj-lt"/>
+                <a:ea typeface="+mj-ea"/>
+                <a:cs typeface="+mj-cs"/>
+                <a:sym typeface="Calibri Light"/>
+              </a:defRPr>
+            </a:pPr>
+            <a:r>
+              <a:rPr lang="pt-BR" altLang="zh-CN" dirty="0" smtClean="0"/>
+              <a:t>	jad </a:t>
+            </a:r>
+            <a:r>
+              <a:rPr lang="pt-BR" altLang="zh-CN" dirty="0"/>
+              <a:t>-o -r -sjava -dsrc tree/**/*.class</a:t>
+            </a:r>
+            <a:endParaRPr lang="en-US" altLang="zh-CN" dirty="0"/>
+          </a:p>
+        </p:txBody>
+      </p:sp>
+      <p:pic>
+        <p:nvPicPr>
+          <p:cNvPr id="4" name="图片 3"/>
+          <p:cNvPicPr>
+            <a:picLocks noChangeAspect="1"/>
+          </p:cNvPicPr>
+          <p:nvPr/>
+        </p:nvPicPr>
+        <p:blipFill>
+          <a:blip r:embed="rId2">
+            <a:extLst>
+              <a:ext uri="{28A0092B-C50C-407E-A947-70E740481C1C}">
+                <a14:useLocalDpi xmlns:a14="http://schemas.microsoft.com/office/drawing/2010/main" val="0"/>
+              </a:ext>
+            </a:extLst>
+          </a:blip>
+          <a:stretch>
+            <a:fillRect/>
+          </a:stretch>
+        </p:blipFill>
+        <p:spPr>
+          <a:xfrm>
+            <a:off x="8078016" y="2063387"/>
+            <a:ext cx="895350" cy="876300"/>
+          </a:xfrm>
+          <a:prstGeom prst="rect">
+            <a:avLst/>
+          </a:prstGeom>
+        </p:spPr>
+      </p:pic>
+      <p:pic>
+        <p:nvPicPr>
+          <p:cNvPr id="13" name="图片 12"/>
+          <p:cNvPicPr>
+            <a:picLocks noChangeAspect="1"/>
+          </p:cNvPicPr>
+          <p:nvPr/>
+        </p:nvPicPr>
+        <p:blipFill>
+          <a:blip r:embed="rId3">
+            <a:extLst>
+              <a:ext uri="{28A0092B-C50C-407E-A947-70E740481C1C}">
+                <a14:useLocalDpi xmlns:a14="http://schemas.microsoft.com/office/drawing/2010/main" val="0"/>
+              </a:ext>
+            </a:extLst>
+          </a:blip>
+          <a:stretch>
+            <a:fillRect/>
+          </a:stretch>
+        </p:blipFill>
+        <p:spPr>
+          <a:xfrm>
+            <a:off x="8030391" y="4389176"/>
+            <a:ext cx="990600" cy="895350"/>
+          </a:xfrm>
+          <a:prstGeom prst="rect">
+            <a:avLst/>
+          </a:prstGeom>
+        </p:spPr>
+      </p:pic>
+      <p:cxnSp>
+        <p:nvCxnSpPr>
+          <p:cNvPr id="20" name="直接箭头连接符 19"/>
+          <p:cNvCxnSpPr/>
+          <p:nvPr/>
+        </p:nvCxnSpPr>
+        <p:spPr>
+          <a:xfrm>
+            <a:off x="8525691" y="3108960"/>
+            <a:ext cx="0" cy="1058091"/>
+          </a:xfrm>
+          <a:prstGeom prst="straightConnector1">
+            <a:avLst/>
+          </a:prstGeom>
+          <a:noFill/>
+          <a:ln w="25400" cap="flat">
+            <a:solidFill>
+              <a:schemeClr val="accent1"/>
+            </a:solidFill>
+            <a:prstDash val="solid"/>
+            <a:round/>
+            <a:tailEnd type="triangle"/>
+          </a:ln>
+          <a:effectLst/>
+          <a:sp3d/>
+        </p:spPr>
+        <p:style>
+          <a:lnRef idx="0">
+            <a:scrgbClr r="0" g="0" b="0"/>
+          </a:lnRef>
+          <a:fillRef idx="0">
+            <a:scrgbClr r="0" g="0" b="0"/>
+          </a:fillRef>
+          <a:effectRef idx="0">
+            <a:scrgbClr r="0" g="0" b="0"/>
+          </a:effectRef>
+          <a:fontRef idx="none"/>
+        </p:style>
+      </p:cxnSp>
+    </p:spTree>
+    <p:extLst>
+      <p:ext uri="{BB962C8B-B14F-4D97-AF65-F5344CB8AC3E}">
+        <p14:creationId xmlns:p14="http://schemas.microsoft.com/office/powerpoint/2010/main" val="1799820789"/>
+      </p:ext>
+    </p:extLst>
+  </p:cSld>
+  <p:clrMapOvr>
+    <a:masterClrMapping/>
+  </p:clrMapOvr>
+  <p:transition spd="med"/>
+  <p:timing>
+    <p:tnLst>
+      <p:par>
+        <p:cTn id="1" dur="indefinite" restart="never" nodeType="tmRoot">
+          <p:childTnLst>
+            <p:seq concurrent="1" nextAc="seek">
+              <p:cTn id="2" dur="indefinite" nodeType="mainSeq">
+                <p:childTnLst>
+                  <p:par>
+                    <p:cTn id="3" fill="hold">
+                      <p:stCondLst>
+                        <p:cond delay="indefinite"/>
+                      </p:stCondLst>
+                      <p:childTnLst>
+                        <p:par>
+                          <p:cTn id="4" fill="hold">
+                            <p:stCondLst>
+                              <p:cond delay="0"/>
+                            </p:stCondLst>
+                            <p:childTnLst>
+                              <p:par>
+                                <p:cTn id="5" presetID="1" presetClass="entr" presetSubtype="0" fill="hold" nodeType="clickEffect">
+                                  <p:stCondLst>
+                                    <p:cond delay="0"/>
+                                  </p:stCondLst>
+                                  <p:childTnLst>
+                                    <p:set>
+                                      <p:cBhvr>
+                                        <p:cTn id="6" dur="1" fill="hold">
+                                          <p:stCondLst>
+                                            <p:cond delay="0"/>
+                                          </p:stCondLst>
+                                        </p:cTn>
+                                        <p:tgtEl>
+                                          <p:spTgt spid="4"/>
+                                        </p:tgtEl>
+                                        <p:attrNameLst>
+                                          <p:attrName>style.visibility</p:attrName>
+                                        </p:attrNameLst>
+                                      </p:cBhvr>
+                                      <p:to>
+                                        <p:strVal val="visible"/>
+                                      </p:to>
+                                    </p:set>
+                                  </p:childTnLst>
+                                </p:cTn>
+                              </p:par>
+                              <p:par>
+                                <p:cTn id="7" presetID="1" presetClass="entr" presetSubtype="0" fill="hold" nodeType="withEffect">
+                                  <p:stCondLst>
+                                    <p:cond delay="0"/>
+                                  </p:stCondLst>
+                                  <p:childTnLst>
+                                    <p:set>
+                                      <p:cBhvr>
+                                        <p:cTn id="8" dur="1" fill="hold">
+                                          <p:stCondLst>
+                                            <p:cond delay="0"/>
+                                          </p:stCondLst>
+                                        </p:cTn>
+                                        <p:tgtEl>
+                                          <p:spTgt spid="13"/>
+                                        </p:tgtEl>
+                                        <p:attrNameLst>
+                                          <p:attrName>style.visibility</p:attrName>
+                                        </p:attrNameLst>
+                                      </p:cBhvr>
+                                      <p:to>
+                                        <p:strVal val="visible"/>
+                                      </p:to>
+                                    </p:set>
+                                  </p:childTnLst>
+                                </p:cTn>
+                              </p:par>
+                              <p:par>
+                                <p:cTn id="9" presetID="1" presetClass="entr" presetSubtype="0" fill="hold" nodeType="withEffect">
+                                  <p:stCondLst>
+                                    <p:cond delay="0"/>
+                                  </p:stCondLst>
+                                  <p:childTnLst>
+                                    <p:set>
+                                      <p:cBhvr>
+                                        <p:cTn id="10" dur="1" fill="hold">
+                                          <p:stCondLst>
+                                            <p:cond delay="0"/>
+                                          </p:stCondLst>
+                                        </p:cTn>
+                                        <p:tgtEl>
+                                          <p:spTgt spid="20"/>
+                                        </p:tgtEl>
+                                        <p:attrNameLst>
+                                          <p:attrName>style.visibility</p:attrName>
+                                        </p:attrNameLst>
+                                      </p:cBhvr>
+                                      <p:to>
+                                        <p:strVal val="visible"/>
+                                      </p:to>
+                                    </p:set>
+                                  </p:childTnLst>
+                                </p:cTn>
+                              </p:par>
+                            </p:childTnLst>
+                          </p:cTn>
+                        </p:par>
+                      </p:childTnLst>
+                    </p:cTn>
+                  </p:par>
+                </p:childTnLst>
+              </p:cTn>
+              <p:prevCondLst>
+                <p:cond evt="onPrev" delay="0">
+                  <p:tgtEl>
+                    <p:sldTgt/>
+                  </p:tgtEl>
+                </p:cond>
+              </p:prevCondLst>
+              <p:nextCondLst>
+                <p:cond evt="onNext" delay="0">
+                  <p:tgtEl>
+                    <p:sldTgt/>
+                  </p:tgtEl>
+                </p:cond>
+              </p:nextCondLst>
+            </p:seq>
+          </p:childTnLst>
+        </p:cTn>
+      </p:par>
+    </p:tnLst>
+  </p:timing>
+</p:sld>
+</file>
+
+<file path=ppt/slides/slide37.xml><?xml version="1.0" encoding="utf-8"?>
+<p:sld xmlns:a="http://schemas.openxmlformats.org/drawingml/2006/main" xmlns:r="http://schemas.openxmlformats.org/officeDocument/2006/relationships" xmlns:p="http://schemas.openxmlformats.org/presentationml/2006/main">
+  <p:cSld>
+    <p:spTree>
+      <p:nvGrpSpPr>
+        <p:cNvPr id="1" name=""/>
+        <p:cNvGrpSpPr/>
+        <p:nvPr/>
+      </p:nvGrpSpPr>
+      <p:grpSpPr>
+        <a:xfrm>
+          <a:off x="0" y="0"/>
+          <a:ext cx="0" cy="0"/>
+          <a:chOff x="0" y="0"/>
+          <a:chExt cx="0" cy="0"/>
+        </a:xfrm>
+      </p:grpSpPr>
+      <p:sp>
+        <p:nvSpPr>
+          <p:cNvPr id="2" name="标题 1"/>
+          <p:cNvSpPr>
+            <a:spLocks noGrp="1"/>
+          </p:cNvSpPr>
+          <p:nvPr>
+            <p:ph type="title"/>
+          </p:nvPr>
+        </p:nvSpPr>
+        <p:spPr/>
+        <p:txBody>
+          <a:bodyPr/>
+          <a:lstStyle/>
+          <a:p>
+            <a:r>
+              <a:rPr lang="zh-CN" altLang="en-US" dirty="0" smtClean="0">
+                <a:latin typeface="黑体" panose="02010609060101010101" pitchFamily="49" charset="-122"/>
+                <a:ea typeface="黑体" panose="02010609060101010101" pitchFamily="49" charset="-122"/>
+              </a:rPr>
+              <a:t>实验</a:t>
+            </a:r>
+            <a:endParaRPr lang="zh-CN" altLang="en-US" dirty="0">
+              <a:latin typeface="黑体" panose="02010609060101010101" pitchFamily="49" charset="-122"/>
+              <a:ea typeface="黑体" panose="02010609060101010101" pitchFamily="49" charset="-122"/>
+            </a:endParaRPr>
+          </a:p>
+        </p:txBody>
+      </p:sp>
+      <p:sp>
+        <p:nvSpPr>
+          <p:cNvPr id="3" name="Limitation…"/>
+          <p:cNvSpPr txBox="1"/>
+          <p:nvPr/>
+        </p:nvSpPr>
+        <p:spPr>
+          <a:xfrm>
+            <a:off x="1627113" y="1691239"/>
+            <a:ext cx="9020110" cy="2708430"/>
+          </a:xfrm>
+          <a:prstGeom prst="rect">
+            <a:avLst/>
+          </a:prstGeom>
+          <a:ln w="12700">
+            <a:miter lim="400000"/>
+          </a:ln>
+          <a:extLst>
+            <a:ext uri="{C572A759-6A51-4108-AA02-DFA0A04FC94B}">
+              <ma14:wrappingTextBoxFlag xmlns="" xmlns:ma14="http://schemas.microsoft.com/office/mac/drawingml/2011/main" val="1"/>
+            </a:ext>
+          </a:extLst>
+        </p:spPr>
+        <p:txBody>
+          <a:bodyPr lIns="45718" tIns="45718" rIns="45718" bIns="45718">
+            <a:spAutoFit/>
+          </a:bodyPr>
+          <a:lstStyle/>
+          <a:p>
+            <a:pPr algn="l" defTabSz="457200">
+              <a:lnSpc>
+                <a:spcPts val="4500"/>
+              </a:lnSpc>
+              <a:spcBef>
+                <a:spcPts val="1200"/>
+              </a:spcBef>
+              <a:defRPr sz="2600" b="0">
+                <a:solidFill>
+                  <a:srgbClr val="000000"/>
+                </a:solidFill>
+                <a:latin typeface="+mj-lt"/>
+                <a:ea typeface="+mj-ea"/>
+                <a:cs typeface="+mj-cs"/>
+                <a:sym typeface="Calibri Light"/>
+              </a:defRPr>
+            </a:pPr>
+            <a:r>
+              <a:rPr lang="en-US" altLang="zh-CN" dirty="0" smtClean="0"/>
+              <a:t>2. APK</a:t>
+            </a:r>
+            <a:r>
+              <a:rPr lang="zh-CN" altLang="en-US" dirty="0" smtClean="0"/>
+              <a:t>文件的爬取</a:t>
+            </a:r>
+            <a:endParaRPr lang="en-US" altLang="zh-CN" dirty="0" smtClean="0"/>
+          </a:p>
+          <a:p>
+            <a:pPr algn="l" defTabSz="457200">
+              <a:lnSpc>
+                <a:spcPts val="4500"/>
+              </a:lnSpc>
+              <a:spcBef>
+                <a:spcPts val="1200"/>
+              </a:spcBef>
+              <a:defRPr sz="2600" b="0">
+                <a:solidFill>
+                  <a:srgbClr val="000000"/>
+                </a:solidFill>
+                <a:latin typeface="+mj-lt"/>
+                <a:ea typeface="+mj-ea"/>
+                <a:cs typeface="+mj-cs"/>
+                <a:sym typeface="Calibri Light"/>
+              </a:defRPr>
+            </a:pPr>
+            <a:r>
+              <a:rPr lang="en-US" altLang="zh-CN" dirty="0">
+                <a:hlinkClick r:id="rId2"/>
+              </a:rPr>
+              <a:t>https://</a:t>
+            </a:r>
+            <a:r>
+              <a:rPr lang="en-US" altLang="zh-CN" dirty="0" smtClean="0">
+                <a:hlinkClick r:id="rId2"/>
+              </a:rPr>
+              <a:t>github.com/QyMars/APKSpider</a:t>
+            </a:r>
+            <a:endParaRPr lang="en-US" altLang="zh-CN" dirty="0" smtClean="0"/>
+          </a:p>
+          <a:p>
+            <a:pPr algn="l" defTabSz="457200">
+              <a:lnSpc>
+                <a:spcPts val="4500"/>
+              </a:lnSpc>
+              <a:spcBef>
+                <a:spcPts val="1200"/>
+              </a:spcBef>
+              <a:defRPr sz="2600" b="0">
+                <a:solidFill>
+                  <a:srgbClr val="000000"/>
+                </a:solidFill>
+                <a:latin typeface="+mj-lt"/>
+                <a:ea typeface="+mj-ea"/>
+                <a:cs typeface="+mj-cs"/>
+                <a:sym typeface="Calibri Light"/>
+              </a:defRPr>
+            </a:pPr>
+            <a:r>
+              <a:rPr lang="en-US" altLang="zh-CN" dirty="0" err="1" smtClean="0"/>
+              <a:t>APKSpider</a:t>
+            </a:r>
+            <a:r>
+              <a:rPr lang="en-US" altLang="zh-CN" dirty="0"/>
+              <a:t> </a:t>
+            </a:r>
+            <a:r>
+              <a:rPr lang="zh-CN" altLang="en-US" sz="2400" b="0" dirty="0" smtClean="0">
+                <a:solidFill>
+                  <a:srgbClr val="000000"/>
+                </a:solidFill>
+                <a:latin typeface="黑体" panose="02010609060101010101" pitchFamily="49" charset="-122"/>
+                <a:ea typeface="黑体" panose="02010609060101010101" pitchFamily="49" charset="-122"/>
+              </a:rPr>
+              <a:t>使</a:t>
+            </a:r>
+            <a:r>
+              <a:rPr lang="zh-CN" altLang="en-US" sz="2400" b="0" dirty="0">
+                <a:solidFill>
+                  <a:srgbClr val="000000"/>
+                </a:solidFill>
+                <a:latin typeface="黑体" panose="02010609060101010101" pitchFamily="49" charset="-122"/>
+                <a:ea typeface="黑体" panose="02010609060101010101" pitchFamily="49" charset="-122"/>
+              </a:rPr>
+              <a:t>用</a:t>
+            </a:r>
+            <a:r>
+              <a:rPr lang="en-US" altLang="zh-CN" sz="2400" b="0" dirty="0">
+                <a:solidFill>
+                  <a:srgbClr val="000000"/>
+                </a:solidFill>
+                <a:latin typeface="黑体" panose="02010609060101010101" pitchFamily="49" charset="-122"/>
+                <a:ea typeface="黑体" panose="02010609060101010101" pitchFamily="49" charset="-122"/>
+              </a:rPr>
+              <a:t>Python</a:t>
+            </a:r>
+            <a:r>
+              <a:rPr lang="zh-CN" altLang="en-US" sz="2400" b="0" dirty="0">
+                <a:solidFill>
+                  <a:srgbClr val="000000"/>
+                </a:solidFill>
+                <a:latin typeface="黑体" panose="02010609060101010101" pitchFamily="49" charset="-122"/>
+                <a:ea typeface="黑体" panose="02010609060101010101" pitchFamily="49" charset="-122"/>
+              </a:rPr>
+              <a:t>实现对于小米商城中的</a:t>
+            </a:r>
+            <a:r>
+              <a:rPr lang="en-US" altLang="zh-CN" sz="2400" b="0" dirty="0">
+                <a:solidFill>
+                  <a:srgbClr val="000000"/>
+                </a:solidFill>
+                <a:latin typeface="黑体" panose="02010609060101010101" pitchFamily="49" charset="-122"/>
+                <a:ea typeface="黑体" panose="02010609060101010101" pitchFamily="49" charset="-122"/>
+              </a:rPr>
+              <a:t>APK</a:t>
+            </a:r>
+            <a:r>
+              <a:rPr lang="zh-CN" altLang="en-US" sz="2400" b="0" dirty="0">
+                <a:solidFill>
+                  <a:srgbClr val="000000"/>
+                </a:solidFill>
+                <a:latin typeface="黑体" panose="02010609060101010101" pitchFamily="49" charset="-122"/>
+                <a:ea typeface="黑体" panose="02010609060101010101" pitchFamily="49" charset="-122"/>
+              </a:rPr>
+              <a:t>进行爬取，实现自动化爬取功</a:t>
+            </a:r>
+            <a:r>
+              <a:rPr lang="zh-CN" altLang="en-US" sz="2400" b="0" dirty="0" smtClean="0">
+                <a:solidFill>
+                  <a:srgbClr val="000000"/>
+                </a:solidFill>
+                <a:latin typeface="黑体" panose="02010609060101010101" pitchFamily="49" charset="-122"/>
+                <a:ea typeface="黑体" panose="02010609060101010101" pitchFamily="49" charset="-122"/>
+              </a:rPr>
+              <a:t>能</a:t>
+            </a:r>
+            <a:endParaRPr lang="zh-CN" altLang="en-US" sz="2400" b="0" dirty="0">
+              <a:solidFill>
+                <a:srgbClr val="000000"/>
+              </a:solidFill>
+              <a:latin typeface="黑体" panose="02010609060101010101" pitchFamily="49" charset="-122"/>
+              <a:ea typeface="黑体" panose="02010609060101010101" pitchFamily="49" charset="-122"/>
+            </a:endParaRPr>
+          </a:p>
+        </p:txBody>
+      </p:sp>
+    </p:spTree>
+    <p:extLst>
+      <p:ext uri="{BB962C8B-B14F-4D97-AF65-F5344CB8AC3E}">
+        <p14:creationId xmlns:p14="http://schemas.microsoft.com/office/powerpoint/2010/main" val="3346625805"/>
+      </p:ext>
+    </p:extLst>
+  </p:cSld>
+  <p:clrMapOvr>
+    <a:masterClrMapping/>
+  </p:clrMapOvr>
+  <p:transition spd="med"/>
+  <p:timing>
+    <p:tnLst>
+      <p:par>
+        <p:cTn id="1" dur="indefinite" restart="never" nodeType="tmRoot"/>
+      </p:par>
+    </p:tnLst>
+  </p:timing>
+</p:sld>
+</file>
+
+<file path=ppt/slides/slide38.xml><?xml version="1.0" encoding="utf-8"?>
+<p:sld xmlns:a="http://schemas.openxmlformats.org/drawingml/2006/main" xmlns:r="http://schemas.openxmlformats.org/officeDocument/2006/relationships" xmlns:p="http://schemas.openxmlformats.org/presentationml/2006/main">
+  <p:cSld>
+    <p:spTree>
+      <p:nvGrpSpPr>
+        <p:cNvPr id="1" name=""/>
+        <p:cNvGrpSpPr/>
+        <p:nvPr/>
+      </p:nvGrpSpPr>
+      <p:grpSpPr>
+        <a:xfrm>
+          <a:off x="0" y="0"/>
+          <a:ext cx="0" cy="0"/>
+          <a:chOff x="0" y="0"/>
+          <a:chExt cx="0" cy="0"/>
+        </a:xfrm>
+      </p:grpSpPr>
+      <p:sp>
+        <p:nvSpPr>
+          <p:cNvPr id="3" name="Limitation…"/>
+          <p:cNvSpPr txBox="1"/>
+          <p:nvPr/>
+        </p:nvSpPr>
+        <p:spPr>
+          <a:xfrm>
+            <a:off x="1627113" y="1691239"/>
+            <a:ext cx="9020110" cy="611254"/>
+          </a:xfrm>
+          <a:prstGeom prst="rect">
+            <a:avLst/>
+          </a:prstGeom>
+          <a:ln w="12700">
+            <a:miter lim="400000"/>
+          </a:ln>
+          <a:extLst>
+            <a:ext uri="{C572A759-6A51-4108-AA02-DFA0A04FC94B}">
+              <ma14:wrappingTextBoxFlag xmlns="" xmlns:ma14="http://schemas.microsoft.com/office/mac/drawingml/2011/main" val="1"/>
+            </a:ext>
+          </a:extLst>
+        </p:spPr>
+        <p:txBody>
+          <a:bodyPr lIns="45718" tIns="45718" rIns="45718" bIns="45718">
+            <a:spAutoFit/>
+          </a:bodyPr>
+          <a:lstStyle/>
+          <a:p>
+            <a:pPr algn="l" defTabSz="457200">
+              <a:lnSpc>
+                <a:spcPts val="4500"/>
+              </a:lnSpc>
+              <a:spcBef>
+                <a:spcPts val="1200"/>
+              </a:spcBef>
+              <a:defRPr sz="2600" b="0">
+                <a:solidFill>
+                  <a:srgbClr val="000000"/>
+                </a:solidFill>
+                <a:latin typeface="+mj-lt"/>
+                <a:ea typeface="+mj-ea"/>
+                <a:cs typeface="+mj-cs"/>
+                <a:sym typeface="Calibri Light"/>
+              </a:defRPr>
+            </a:pPr>
+            <a:r>
+              <a:rPr lang="en-US" altLang="zh-CN" dirty="0" smtClean="0"/>
+              <a:t>2. APK</a:t>
+            </a:r>
+            <a:r>
+              <a:rPr lang="zh-CN" altLang="en-US" dirty="0" smtClean="0"/>
+              <a:t>文件的爬取</a:t>
+            </a:r>
+            <a:endParaRPr lang="en-US" altLang="zh-CN" dirty="0" smtClean="0"/>
+          </a:p>
+        </p:txBody>
+      </p:sp>
+      <p:pic>
+        <p:nvPicPr>
+          <p:cNvPr id="4" name="图片 3"/>
+          <p:cNvPicPr>
+            <a:picLocks noChangeAspect="1"/>
+          </p:cNvPicPr>
+          <p:nvPr/>
+        </p:nvPicPr>
+        <p:blipFill>
+          <a:blip r:embed="rId2">
+            <a:extLst>
+              <a:ext uri="{28A0092B-C50C-407E-A947-70E740481C1C}">
+                <a14:useLocalDpi xmlns:a14="http://schemas.microsoft.com/office/drawing/2010/main" val="0"/>
+              </a:ext>
+            </a:extLst>
+          </a:blip>
+          <a:stretch>
+            <a:fillRect/>
+          </a:stretch>
+        </p:blipFill>
+        <p:spPr>
+          <a:xfrm>
+            <a:off x="1342571" y="0"/>
+            <a:ext cx="9506858" cy="6892472"/>
+          </a:xfrm>
+          <a:prstGeom prst="rect">
+            <a:avLst/>
+          </a:prstGeom>
+        </p:spPr>
+      </p:pic>
+    </p:spTree>
+    <p:extLst>
+      <p:ext uri="{BB962C8B-B14F-4D97-AF65-F5344CB8AC3E}">
+        <p14:creationId xmlns:p14="http://schemas.microsoft.com/office/powerpoint/2010/main" val="3320103028"/>
+      </p:ext>
+    </p:extLst>
+  </p:cSld>
+  <p:clrMapOvr>
+    <a:masterClrMapping/>
+  </p:clrMapOvr>
+  <p:transition spd="med"/>
+  <p:timing>
+    <p:tnLst>
+      <p:par>
+        <p:cTn id="1" dur="indefinite" restart="never" nodeType="tmRoot"/>
+      </p:par>
+    </p:tnLst>
+  </p:timing>
+</p:sld>
+</file>
+
+<file path=ppt/slides/slide39.xml><?xml version="1.0" encoding="utf-8"?>
+<p:sld xmlns:a="http://schemas.openxmlformats.org/drawingml/2006/main" xmlns:r="http://schemas.openxmlformats.org/officeDocument/2006/relationships" xmlns:p="http://schemas.openxmlformats.org/presentationml/2006/main">
+  <p:cSld>
+    <p:spTree>
+      <p:nvGrpSpPr>
+        <p:cNvPr id="1" name=""/>
+        <p:cNvGrpSpPr/>
+        <p:nvPr/>
+      </p:nvGrpSpPr>
+      <p:grpSpPr>
+        <a:xfrm>
+          <a:off x="0" y="0"/>
+          <a:ext cx="0" cy="0"/>
+          <a:chOff x="0" y="0"/>
+          <a:chExt cx="0" cy="0"/>
+        </a:xfrm>
+      </p:grpSpPr>
+      <p:sp>
+        <p:nvSpPr>
+          <p:cNvPr id="428" name="Shape 720"/>
           <p:cNvSpPr/>
           <p:nvPr/>
         </p:nvSpPr>
@@ -16538,14 +18842,14 @@
       </p:sp>
       <p:sp>
         <p:nvSpPr>
-          <p:cNvPr id="434" name="Shape 733"/>
+          <p:cNvPr id="429" name="Shape 721"/>
           <p:cNvSpPr txBox="1"/>
           <p:nvPr/>
         </p:nvSpPr>
         <p:spPr>
           <a:xfrm>
-            <a:off x="2002026" y="520996"/>
-            <a:ext cx="1552087" cy="916939"/>
+            <a:off x="2207262" y="467775"/>
+            <a:ext cx="1159185" cy="923326"/>
           </a:xfrm>
           <a:prstGeom prst="rect">
             <a:avLst/>
@@ -16555,12 +18859,12 @@
           </a:ln>
           <a:extLst>
             <a:ext uri="{C572A759-6A51-4108-AA02-DFA0A04FC94B}">
-              <ma14:wrappingTextBoxFlag xmlns:ma14="http://schemas.microsoft.com/office/mac/drawingml/2011/main" xmlns="" val="1"/>
+              <ma14:wrappingTextBoxFlag xmlns="" xmlns:ma14="http://schemas.microsoft.com/office/mac/drawingml/2011/main" val="1"/>
             </a:ext>
           </a:extLst>
         </p:spPr>
         <p:txBody>
-          <a:bodyPr wrap="none" lIns="45718" tIns="45718" rIns="45718" bIns="45718">
+          <a:bodyPr wrap="square" lIns="45718" tIns="45718" rIns="45718" bIns="45718">
             <a:spAutoFit/>
           </a:bodyPr>
           <a:lstStyle>
@@ -16575,14 +18879,15 @@
           </a:lstStyle>
           <a:p>
             <a:r>
-              <a:t>END</a:t>
-            </a:r>
-          </a:p>
-        </p:txBody>
-      </p:sp>
-      <p:sp>
-        <p:nvSpPr>
-          <p:cNvPr id="435" name="Shape 734"/>
+              <a:rPr dirty="0"/>
+              <a:t>REF</a:t>
+            </a:r>
+          </a:p>
+        </p:txBody>
+      </p:sp>
+      <p:sp>
+        <p:nvSpPr>
+          <p:cNvPr id="430" name="Shape 722"/>
           <p:cNvSpPr/>
           <p:nvPr/>
         </p:nvSpPr>
@@ -16617,14 +18922,14 @@
       </p:sp>
       <p:sp>
         <p:nvSpPr>
-          <p:cNvPr id="436" name="Shape 735"/>
+          <p:cNvPr id="431" name="Shape 384"/>
           <p:cNvSpPr txBox="1"/>
           <p:nvPr/>
         </p:nvSpPr>
         <p:spPr>
           <a:xfrm>
-            <a:off x="6258490" y="3783886"/>
-            <a:ext cx="3035981" cy="916939"/>
+            <a:off x="1739900" y="2170412"/>
+            <a:ext cx="9797293" cy="3277816"/>
           </a:xfrm>
           <a:prstGeom prst="rect">
             <a:avLst/>
@@ -16634,7 +18939,7 @@
           </a:ln>
           <a:extLst>
             <a:ext uri="{C572A759-6A51-4108-AA02-DFA0A04FC94B}">
-              <ma14:wrappingTextBoxFlag xmlns:ma14="http://schemas.microsoft.com/office/mac/drawingml/2011/main" xmlns="" val="1"/>
+              <ma14:wrappingTextBoxFlag xmlns="" xmlns:ma14="http://schemas.microsoft.com/office/mac/drawingml/2011/main" val="1"/>
             </a:ext>
           </a:extLst>
         </p:spPr>
@@ -16642,23 +18947,143 @@
           <a:bodyPr lIns="45718" tIns="45718" rIns="45718" bIns="45718">
             <a:spAutoFit/>
           </a:bodyPr>
-          <a:lstStyle>
-            <a:lvl1pPr>
-              <a:defRPr sz="5400">
-                <a:solidFill>
-                  <a:srgbClr val="1470C0"/>
-                </a:solidFill>
-                <a:latin typeface="方正超粗黑_GBK"/>
-                <a:ea typeface="方正超粗黑_GBK"/>
-                <a:cs typeface="方正超粗黑_GBK"/>
-                <a:sym typeface="方正超粗黑_GBK"/>
+          <a:lstStyle/>
+          <a:p>
+            <a:pPr marL="307473" indent="-307473" algn="l">
+              <a:buSzPct val="100000"/>
+              <a:buAutoNum type="arabicPeriod"/>
+              <a:defRPr sz="2300" b="0">
+                <a:solidFill>
+                  <a:srgbClr val="0070C0"/>
+                </a:solidFill>
+                <a:latin typeface="黑体"/>
+                <a:ea typeface="黑体"/>
+                <a:cs typeface="黑体"/>
+                <a:sym typeface="黑体"/>
               </a:defRPr>
-            </a:lvl1pPr>
-          </a:lstStyle>
-          <a:p>
-            <a:r>
-              <a:t>THANKS</a:t>
-            </a:r>
+            </a:pPr>
+            <a:r>
+              <a:rPr dirty="0">
+                <a:solidFill>
+                  <a:srgbClr val="000000"/>
+                </a:solidFill>
+              </a:rPr>
+              <a:t>Achieving Accuracy and Scalability Simultaneously in Detecting Application Clones on Android Markets</a:t>
+            </a:r>
+          </a:p>
+          <a:p>
+            <a:pPr algn="l">
+              <a:defRPr sz="2300" b="0">
+                <a:solidFill>
+                  <a:srgbClr val="0070C0"/>
+                </a:solidFill>
+                <a:latin typeface="黑体"/>
+                <a:ea typeface="黑体"/>
+                <a:cs typeface="黑体"/>
+                <a:sym typeface="黑体"/>
+              </a:defRPr>
+            </a:pPr>
+            <a:endParaRPr dirty="0">
+              <a:solidFill>
+                <a:srgbClr val="000000"/>
+              </a:solidFill>
+            </a:endParaRPr>
+          </a:p>
+          <a:p>
+            <a:pPr marL="307473" indent="-307473" algn="l">
+              <a:buSzPct val="100000"/>
+              <a:buAutoNum type="arabicPeriod" startAt="2"/>
+              <a:defRPr sz="2300" b="0">
+                <a:solidFill>
+                  <a:srgbClr val="0070C0"/>
+                </a:solidFill>
+                <a:latin typeface="黑体"/>
+                <a:ea typeface="黑体"/>
+                <a:cs typeface="黑体"/>
+                <a:sym typeface="黑体"/>
+              </a:defRPr>
+            </a:pPr>
+            <a:r>
+              <a:rPr dirty="0">
+                <a:solidFill>
+                  <a:srgbClr val="000000"/>
+                </a:solidFill>
+              </a:rPr>
+              <a:t>On Finding Duplication and Near-Duplication in Large Software System</a:t>
+            </a:r>
+          </a:p>
+          <a:p>
+            <a:pPr algn="l">
+              <a:defRPr sz="2300" b="0">
+                <a:solidFill>
+                  <a:srgbClr val="0070C0"/>
+                </a:solidFill>
+                <a:latin typeface="黑体"/>
+                <a:ea typeface="黑体"/>
+                <a:cs typeface="黑体"/>
+                <a:sym typeface="黑体"/>
+              </a:defRPr>
+            </a:pPr>
+            <a:endParaRPr dirty="0">
+              <a:solidFill>
+                <a:srgbClr val="000000"/>
+              </a:solidFill>
+            </a:endParaRPr>
+          </a:p>
+          <a:p>
+            <a:pPr marL="307473" indent="-307473" algn="l">
+              <a:buSzPct val="100000"/>
+              <a:buAutoNum type="arabicPeriod" startAt="3"/>
+              <a:defRPr sz="2300" b="0">
+                <a:solidFill>
+                  <a:srgbClr val="0070C0"/>
+                </a:solidFill>
+                <a:latin typeface="黑体"/>
+                <a:ea typeface="黑体"/>
+                <a:cs typeface="黑体"/>
+                <a:sym typeface="黑体"/>
+              </a:defRPr>
+            </a:pPr>
+            <a:r>
+              <a:rPr dirty="0" err="1">
+                <a:solidFill>
+                  <a:srgbClr val="000000"/>
+                </a:solidFill>
+              </a:rPr>
+              <a:t>CCFinder</a:t>
+            </a:r>
+            <a:r>
+              <a:rPr dirty="0">
+                <a:solidFill>
+                  <a:srgbClr val="000000"/>
+                </a:solidFill>
+              </a:rPr>
+              <a:t>: A </a:t>
+            </a:r>
+            <a:r>
+              <a:rPr dirty="0" err="1">
+                <a:solidFill>
+                  <a:srgbClr val="000000"/>
+                </a:solidFill>
+              </a:rPr>
+              <a:t>Multilinguistic</a:t>
+            </a:r>
+            <a:r>
+              <a:rPr dirty="0">
+                <a:solidFill>
+                  <a:srgbClr val="000000"/>
+                </a:solidFill>
+              </a:rPr>
+              <a:t> Token-Based Code Clone Detection System for Large Scale Source Code</a:t>
+            </a:r>
+            <a:r>
+              <a:rPr dirty="0"/>
+              <a:t/>
+            </a:r>
+            <a:br>
+              <a:rPr dirty="0"/>
+            </a:br>
+            <a:endParaRPr dirty="0"/>
           </a:p>
         </p:txBody>
       </p:sp>
@@ -16746,7 +19171,7 @@
           </a:ln>
           <a:extLst>
             <a:ext uri="{C572A759-6A51-4108-AA02-DFA0A04FC94B}">
-              <ma14:wrappingTextBoxFlag xmlns:ma14="http://schemas.microsoft.com/office/mac/drawingml/2011/main" xmlns="" val="1"/>
+              <ma14:wrappingTextBoxFlag xmlns="" xmlns:ma14="http://schemas.microsoft.com/office/mac/drawingml/2011/main" val="1"/>
             </a:ext>
           </a:extLst>
         </p:spPr>
@@ -16810,6 +19235,200 @@
     <a:masterClrMapping/>
   </p:clrMapOvr>
   <p:transition spd="med"/>
+</p:sld>
+</file>
+
+<file path=ppt/slides/slide40.xml><?xml version="1.0" encoding="utf-8"?>
+<p:sld xmlns:a="http://schemas.openxmlformats.org/drawingml/2006/main" xmlns:r="http://schemas.openxmlformats.org/officeDocument/2006/relationships" xmlns:p="http://schemas.openxmlformats.org/presentationml/2006/main">
+  <p:cSld>
+    <p:spTree>
+      <p:nvGrpSpPr>
+        <p:cNvPr id="1" name=""/>
+        <p:cNvGrpSpPr/>
+        <p:nvPr/>
+      </p:nvGrpSpPr>
+      <p:grpSpPr>
+        <a:xfrm>
+          <a:off x="0" y="0"/>
+          <a:ext cx="0" cy="0"/>
+          <a:chOff x="0" y="0"/>
+          <a:chExt cx="0" cy="0"/>
+        </a:xfrm>
+      </p:grpSpPr>
+      <p:sp>
+        <p:nvSpPr>
+          <p:cNvPr id="433" name="Shape 732"/>
+          <p:cNvSpPr/>
+          <p:nvPr/>
+        </p:nvSpPr>
+        <p:spPr>
+          <a:xfrm>
+            <a:off x="1739900" y="-114302"/>
+            <a:ext cx="2093911" cy="1649417"/>
+          </a:xfrm>
+          <a:prstGeom prst="rect">
+            <a:avLst/>
+          </a:prstGeom>
+          <a:solidFill>
+            <a:srgbClr val="0070C0"/>
+          </a:solidFill>
+          <a:ln w="12700">
+            <a:solidFill>
+              <a:srgbClr val="FFFFFF"/>
+            </a:solidFill>
+            <a:miter/>
+          </a:ln>
+        </p:spPr>
+        <p:txBody>
+          <a:bodyPr lIns="45718" tIns="45718" rIns="45718" bIns="45718" anchor="ctr"/>
+          <a:lstStyle/>
+          <a:p>
+            <a:pPr algn="ctr">
+              <a:defRPr sz="1800" b="0"/>
+            </a:pPr>
+            <a:endParaRPr/>
+          </a:p>
+        </p:txBody>
+      </p:sp>
+      <p:sp>
+        <p:nvSpPr>
+          <p:cNvPr id="434" name="Shape 733"/>
+          <p:cNvSpPr txBox="1"/>
+          <p:nvPr/>
+        </p:nvSpPr>
+        <p:spPr>
+          <a:xfrm>
+            <a:off x="2002026" y="520996"/>
+            <a:ext cx="1552087" cy="916939"/>
+          </a:xfrm>
+          <a:prstGeom prst="rect">
+            <a:avLst/>
+          </a:prstGeom>
+          <a:ln w="12700">
+            <a:miter lim="400000"/>
+          </a:ln>
+          <a:extLst>
+            <a:ext uri="{C572A759-6A51-4108-AA02-DFA0A04FC94B}">
+              <ma14:wrappingTextBoxFlag xmlns="" xmlns:ma14="http://schemas.microsoft.com/office/mac/drawingml/2011/main" val="1"/>
+            </a:ext>
+          </a:extLst>
+        </p:spPr>
+        <p:txBody>
+          <a:bodyPr wrap="none" lIns="45718" tIns="45718" rIns="45718" bIns="45718">
+            <a:spAutoFit/>
+          </a:bodyPr>
+          <a:lstStyle>
+            <a:lvl1pPr>
+              <a:defRPr sz="5400">
+                <a:latin typeface="方正超粗黑_GBK"/>
+                <a:ea typeface="方正超粗黑_GBK"/>
+                <a:cs typeface="方正超粗黑_GBK"/>
+                <a:sym typeface="方正超粗黑_GBK"/>
+              </a:defRPr>
+            </a:lvl1pPr>
+          </a:lstStyle>
+          <a:p>
+            <a:r>
+              <a:t>END</a:t>
+            </a:r>
+          </a:p>
+        </p:txBody>
+      </p:sp>
+      <p:sp>
+        <p:nvSpPr>
+          <p:cNvPr id="435" name="Shape 734"/>
+          <p:cNvSpPr/>
+          <p:nvPr/>
+        </p:nvSpPr>
+        <p:spPr>
+          <a:xfrm>
+            <a:off x="1739900" y="6477000"/>
+            <a:ext cx="2093911" cy="1649415"/>
+          </a:xfrm>
+          <a:prstGeom prst="rect">
+            <a:avLst/>
+          </a:prstGeom>
+          <a:solidFill>
+            <a:srgbClr val="0070C0"/>
+          </a:solidFill>
+          <a:ln w="12700">
+            <a:solidFill>
+              <a:srgbClr val="FFFFFF"/>
+            </a:solidFill>
+            <a:miter/>
+          </a:ln>
+        </p:spPr>
+        <p:txBody>
+          <a:bodyPr lIns="45718" tIns="45718" rIns="45718" bIns="45718" anchor="ctr"/>
+          <a:lstStyle/>
+          <a:p>
+            <a:pPr algn="ctr">
+              <a:defRPr sz="1800" b="0"/>
+            </a:pPr>
+            <a:endParaRPr/>
+          </a:p>
+        </p:txBody>
+      </p:sp>
+      <p:sp>
+        <p:nvSpPr>
+          <p:cNvPr id="436" name="Shape 735"/>
+          <p:cNvSpPr txBox="1"/>
+          <p:nvPr/>
+        </p:nvSpPr>
+        <p:spPr>
+          <a:xfrm>
+            <a:off x="6258490" y="3783886"/>
+            <a:ext cx="3035981" cy="916939"/>
+          </a:xfrm>
+          <a:prstGeom prst="rect">
+            <a:avLst/>
+          </a:prstGeom>
+          <a:ln w="12700">
+            <a:miter lim="400000"/>
+          </a:ln>
+          <a:extLst>
+            <a:ext uri="{C572A759-6A51-4108-AA02-DFA0A04FC94B}">
+              <ma14:wrappingTextBoxFlag xmlns="" xmlns:ma14="http://schemas.microsoft.com/office/mac/drawingml/2011/main" val="1"/>
+            </a:ext>
+          </a:extLst>
+        </p:spPr>
+        <p:txBody>
+          <a:bodyPr lIns="45718" tIns="45718" rIns="45718" bIns="45718">
+            <a:spAutoFit/>
+          </a:bodyPr>
+          <a:lstStyle>
+            <a:lvl1pPr>
+              <a:defRPr sz="5400">
+                <a:solidFill>
+                  <a:srgbClr val="1470C0"/>
+                </a:solidFill>
+                <a:latin typeface="方正超粗黑_GBK"/>
+                <a:ea typeface="方正超粗黑_GBK"/>
+                <a:cs typeface="方正超粗黑_GBK"/>
+                <a:sym typeface="方正超粗黑_GBK"/>
+              </a:defRPr>
+            </a:lvl1pPr>
+          </a:lstStyle>
+          <a:p>
+            <a:r>
+              <a:t>THANKS</a:t>
+            </a:r>
+          </a:p>
+        </p:txBody>
+      </p:sp>
+    </p:spTree>
+  </p:cSld>
+  <p:clrMapOvr>
+    <a:masterClrMapping/>
+  </p:clrMapOvr>
+  <p:transition spd="med"/>
+  <p:timing>
+    <p:tnLst>
+      <p:par>
+        <p:cTn id="1" dur="indefinite" restart="never" nodeType="tmRoot"/>
+      </p:par>
+    </p:tnLst>
+  </p:timing>
 </p:sld>
 </file>
 
@@ -16881,7 +19500,7 @@
           </a:ln>
           <a:extLst>
             <a:ext uri="{C572A759-6A51-4108-AA02-DFA0A04FC94B}">
-              <ma14:wrappingTextBoxFlag xmlns:ma14="http://schemas.microsoft.com/office/mac/drawingml/2011/main" xmlns="" val="1"/>
+              <ma14:wrappingTextBoxFlag xmlns="" xmlns:ma14="http://schemas.microsoft.com/office/mac/drawingml/2011/main" val="1"/>
             </a:ext>
           </a:extLst>
         </p:spPr>
@@ -16925,7 +19544,7 @@
           </a:ln>
           <a:extLst>
             <a:ext uri="{C572A759-6A51-4108-AA02-DFA0A04FC94B}">
-              <ma14:wrappingTextBoxFlag xmlns:ma14="http://schemas.microsoft.com/office/mac/drawingml/2011/main" xmlns="" val="1"/>
+              <ma14:wrappingTextBoxFlag xmlns="" xmlns:ma14="http://schemas.microsoft.com/office/mac/drawingml/2011/main" val="1"/>
             </a:ext>
           </a:extLst>
         </p:spPr>
@@ -16973,7 +19592,7 @@
           </a:ln>
           <a:extLst>
             <a:ext uri="{C572A759-6A51-4108-AA02-DFA0A04FC94B}">
-              <ma14:wrappingTextBoxFlag xmlns:ma14="http://schemas.microsoft.com/office/mac/drawingml/2011/main" xmlns="" val="1"/>
+              <ma14:wrappingTextBoxFlag xmlns="" xmlns:ma14="http://schemas.microsoft.com/office/mac/drawingml/2011/main" val="1"/>
             </a:ext>
           </a:extLst>
         </p:spPr>
@@ -17030,7 +19649,7 @@
           </a:ln>
           <a:extLst>
             <a:ext uri="{C572A759-6A51-4108-AA02-DFA0A04FC94B}">
-              <ma14:wrappingTextBoxFlag xmlns:ma14="http://schemas.microsoft.com/office/mac/drawingml/2011/main" xmlns="" val="1"/>
+              <ma14:wrappingTextBoxFlag xmlns="" xmlns:ma14="http://schemas.microsoft.com/office/mac/drawingml/2011/main" val="1"/>
             </a:ext>
           </a:extLst>
         </p:spPr>
@@ -17429,7 +20048,7 @@
           </a:ln>
           <a:extLst>
             <a:ext uri="{C572A759-6A51-4108-AA02-DFA0A04FC94B}">
-              <ma14:wrappingTextBoxFlag xmlns:ma14="http://schemas.microsoft.com/office/mac/drawingml/2011/main" xmlns="" val="1"/>
+              <ma14:wrappingTextBoxFlag xmlns="" xmlns:ma14="http://schemas.microsoft.com/office/mac/drawingml/2011/main" val="1"/>
             </a:ext>
           </a:extLst>
         </p:spPr>
@@ -17473,7 +20092,7 @@
           </a:ln>
           <a:extLst>
             <a:ext uri="{C572A759-6A51-4108-AA02-DFA0A04FC94B}">
-              <ma14:wrappingTextBoxFlag xmlns:ma14="http://schemas.microsoft.com/office/mac/drawingml/2011/main" xmlns="" val="1"/>
+              <ma14:wrappingTextBoxFlag xmlns="" xmlns:ma14="http://schemas.microsoft.com/office/mac/drawingml/2011/main" val="1"/>
             </a:ext>
           </a:extLst>
         </p:spPr>
@@ -17548,7 +20167,7 @@
           </a:ln>
           <a:extLst>
             <a:ext uri="{C572A759-6A51-4108-AA02-DFA0A04FC94B}">
-              <ma14:wrappingTextBoxFlag xmlns:ma14="http://schemas.microsoft.com/office/mac/drawingml/2011/main" xmlns="" val="1"/>
+              <ma14:wrappingTextBoxFlag xmlns="" xmlns:ma14="http://schemas.microsoft.com/office/mac/drawingml/2011/main" val="1"/>
             </a:ext>
           </a:extLst>
         </p:spPr>
@@ -17771,7 +20390,7 @@
           </a:ln>
           <a:extLst>
             <a:ext uri="{C572A759-6A51-4108-AA02-DFA0A04FC94B}">
-              <ma14:wrappingTextBoxFlag xmlns:ma14="http://schemas.microsoft.com/office/mac/drawingml/2011/main" xmlns="" val="1"/>
+              <ma14:wrappingTextBoxFlag xmlns="" xmlns:ma14="http://schemas.microsoft.com/office/mac/drawingml/2011/main" val="1"/>
             </a:ext>
           </a:extLst>
         </p:spPr>
@@ -17815,7 +20434,7 @@
           </a:ln>
           <a:extLst>
             <a:ext uri="{C572A759-6A51-4108-AA02-DFA0A04FC94B}">
-              <ma14:wrappingTextBoxFlag xmlns:ma14="http://schemas.microsoft.com/office/mac/drawingml/2011/main" xmlns="" val="1"/>
+              <ma14:wrappingTextBoxFlag xmlns="" xmlns:ma14="http://schemas.microsoft.com/office/mac/drawingml/2011/main" val="1"/>
             </a:ext>
           </a:extLst>
         </p:spPr>
@@ -17890,7 +20509,7 @@
           </a:ln>
           <a:extLst>
             <a:ext uri="{C572A759-6A51-4108-AA02-DFA0A04FC94B}">
-              <ma14:wrappingTextBoxFlag xmlns:ma14="http://schemas.microsoft.com/office/mac/drawingml/2011/main" xmlns="" val="1"/>
+              <ma14:wrappingTextBoxFlag xmlns="" xmlns:ma14="http://schemas.microsoft.com/office/mac/drawingml/2011/main" val="1"/>
             </a:ext>
           </a:extLst>
         </p:spPr>
@@ -18235,7 +20854,7 @@
           </a:ln>
           <a:extLst>
             <a:ext uri="{C572A759-6A51-4108-AA02-DFA0A04FC94B}">
-              <ma14:wrappingTextBoxFlag xmlns:ma14="http://schemas.microsoft.com/office/mac/drawingml/2011/main" xmlns="" val="1"/>
+              <ma14:wrappingTextBoxFlag xmlns="" xmlns:ma14="http://schemas.microsoft.com/office/mac/drawingml/2011/main" val="1"/>
             </a:ext>
           </a:extLst>
         </p:spPr>
@@ -18279,7 +20898,7 @@
           </a:ln>
           <a:extLst>
             <a:ext uri="{C572A759-6A51-4108-AA02-DFA0A04FC94B}">
-              <ma14:wrappingTextBoxFlag xmlns:ma14="http://schemas.microsoft.com/office/mac/drawingml/2011/main" xmlns="" val="1"/>
+              <ma14:wrappingTextBoxFlag xmlns="" xmlns:ma14="http://schemas.microsoft.com/office/mac/drawingml/2011/main" val="1"/>
             </a:ext>
           </a:extLst>
         </p:spPr>
@@ -18354,7 +20973,7 @@
           </a:ln>
           <a:extLst>
             <a:ext uri="{C572A759-6A51-4108-AA02-DFA0A04FC94B}">
-              <ma14:wrappingTextBoxFlag xmlns:ma14="http://schemas.microsoft.com/office/mac/drawingml/2011/main" xmlns="" val="1"/>
+              <ma14:wrappingTextBoxFlag xmlns="" xmlns:ma14="http://schemas.microsoft.com/office/mac/drawingml/2011/main" val="1"/>
             </a:ext>
           </a:extLst>
         </p:spPr>
@@ -18703,7 +21322,7 @@
           </a:ln>
           <a:extLst>
             <a:ext uri="{C572A759-6A51-4108-AA02-DFA0A04FC94B}">
-              <ma14:wrappingTextBoxFlag xmlns:ma14="http://schemas.microsoft.com/office/mac/drawingml/2011/main" xmlns="" val="1"/>
+              <ma14:wrappingTextBoxFlag xmlns="" xmlns:ma14="http://schemas.microsoft.com/office/mac/drawingml/2011/main" val="1"/>
             </a:ext>
           </a:extLst>
         </p:spPr>
@@ -18747,7 +21366,7 @@
           </a:ln>
           <a:extLst>
             <a:ext uri="{C572A759-6A51-4108-AA02-DFA0A04FC94B}">
-              <ma14:wrappingTextBoxFlag xmlns:ma14="http://schemas.microsoft.com/office/mac/drawingml/2011/main" xmlns="" val="1"/>
+              <ma14:wrappingTextBoxFlag xmlns="" xmlns:ma14="http://schemas.microsoft.com/office/mac/drawingml/2011/main" val="1"/>
             </a:ext>
           </a:extLst>
         </p:spPr>
@@ -18822,7 +21441,7 @@
           </a:ln>
           <a:extLst>
             <a:ext uri="{C572A759-6A51-4108-AA02-DFA0A04FC94B}">
-              <ma14:wrappingTextBoxFlag xmlns:ma14="http://schemas.microsoft.com/office/mac/drawingml/2011/main" xmlns="" val="1"/>
+              <ma14:wrappingTextBoxFlag xmlns="" xmlns:ma14="http://schemas.microsoft.com/office/mac/drawingml/2011/main" val="1"/>
             </a:ext>
           </a:extLst>
         </p:spPr>

</xml_diff>